<commit_message>
Se modificaron y agregaron flujos de trabajo en el 01_Documento_Negocio/Modelo de negocio.docx y se agregaron los flujogramas correspondientes en 01_Documento_Negocio/PPT_Flujograma - Proceso Mejorado/PPT_Flujograma - Proceso Mejorado.pptx
</commit_message>
<xml_diff>
--- a/repository/S.A.P.O/Producto/Iteraciones/Iteracion_02/01_Documento_Negocio/PPT_Flujograma - Proceso Mejorado/PPT_Flujograma - Proceso Mejorado.pptx
+++ b/repository/S.A.P.O/Producto/Iteraciones/Iteracion_02/01_Documento_Negocio/PPT_Flujograma - Proceso Mejorado/PPT_Flujograma - Proceso Mejorado.pptx
@@ -5,11 +5,12 @@
     <p:sldMasterId id="2147483648" r:id="rId1"/>
   </p:sldMasterIdLst>
   <p:notesMasterIdLst>
-    <p:notesMasterId r:id="rId4"/>
+    <p:notesMasterId r:id="rId5"/>
   </p:notesMasterIdLst>
   <p:sldIdLst>
     <p:sldId id="256" r:id="rId2"/>
-    <p:sldId id="257" r:id="rId3"/>
+    <p:sldId id="258" r:id="rId3"/>
+    <p:sldId id="257" r:id="rId4"/>
   </p:sldIdLst>
   <p:sldSz cx="9906000" cy="7453313"/>
   <p:notesSz cx="6858000" cy="9144000"/>
@@ -209,7 +210,7 @@
           <a:p>
             <a:fld id="{F8689C98-693D-4114-AC58-422815A38E22}" type="datetimeFigureOut">
               <a:rPr lang="es-AR" smtClean="0"/>
-              <a:t>17/08/2013</a:t>
+              <a:t>26/08/2013</a:t>
             </a:fld>
             <a:endParaRPr lang="es-AR"/>
           </a:p>
@@ -743,7 +744,7 @@
             <a:fld id="{F2836247-D755-492A-BA3E-93510ACEE91B}" type="datetimeFigureOut">
               <a:rPr lang="es-AR" smtClean="0"/>
               <a:pPr/>
-              <a:t>17/08/2013</a:t>
+              <a:t>26/08/2013</a:t>
             </a:fld>
             <a:endParaRPr lang="es-AR" dirty="0"/>
           </a:p>
@@ -915,7 +916,7 @@
             <a:fld id="{F2836247-D755-492A-BA3E-93510ACEE91B}" type="datetimeFigureOut">
               <a:rPr lang="es-AR" smtClean="0"/>
               <a:pPr/>
-              <a:t>17/08/2013</a:t>
+              <a:t>26/08/2013</a:t>
             </a:fld>
             <a:endParaRPr lang="es-AR" dirty="0"/>
           </a:p>
@@ -1097,7 +1098,7 @@
             <a:fld id="{F2836247-D755-492A-BA3E-93510ACEE91B}" type="datetimeFigureOut">
               <a:rPr lang="es-AR" smtClean="0"/>
               <a:pPr/>
-              <a:t>17/08/2013</a:t>
+              <a:t>26/08/2013</a:t>
             </a:fld>
             <a:endParaRPr lang="es-AR" dirty="0"/>
           </a:p>
@@ -1269,7 +1270,7 @@
             <a:fld id="{F2836247-D755-492A-BA3E-93510ACEE91B}" type="datetimeFigureOut">
               <a:rPr lang="es-AR" smtClean="0"/>
               <a:pPr/>
-              <a:t>17/08/2013</a:t>
+              <a:t>26/08/2013</a:t>
             </a:fld>
             <a:endParaRPr lang="es-AR" dirty="0"/>
           </a:p>
@@ -1517,7 +1518,7 @@
             <a:fld id="{F2836247-D755-492A-BA3E-93510ACEE91B}" type="datetimeFigureOut">
               <a:rPr lang="es-AR" smtClean="0"/>
               <a:pPr/>
-              <a:t>17/08/2013</a:t>
+              <a:t>26/08/2013</a:t>
             </a:fld>
             <a:endParaRPr lang="es-AR" dirty="0"/>
           </a:p>
@@ -1807,7 +1808,7 @@
             <a:fld id="{F2836247-D755-492A-BA3E-93510ACEE91B}" type="datetimeFigureOut">
               <a:rPr lang="es-AR" smtClean="0"/>
               <a:pPr/>
-              <a:t>17/08/2013</a:t>
+              <a:t>26/08/2013</a:t>
             </a:fld>
             <a:endParaRPr lang="es-AR" dirty="0"/>
           </a:p>
@@ -2231,7 +2232,7 @@
             <a:fld id="{F2836247-D755-492A-BA3E-93510ACEE91B}" type="datetimeFigureOut">
               <a:rPr lang="es-AR" smtClean="0"/>
               <a:pPr/>
-              <a:t>17/08/2013</a:t>
+              <a:t>26/08/2013</a:t>
             </a:fld>
             <a:endParaRPr lang="es-AR" dirty="0"/>
           </a:p>
@@ -2351,7 +2352,7 @@
             <a:fld id="{F2836247-D755-492A-BA3E-93510ACEE91B}" type="datetimeFigureOut">
               <a:rPr lang="es-AR" smtClean="0"/>
               <a:pPr/>
-              <a:t>17/08/2013</a:t>
+              <a:t>26/08/2013</a:t>
             </a:fld>
             <a:endParaRPr lang="es-AR" dirty="0"/>
           </a:p>
@@ -2448,7 +2449,7 @@
             <a:fld id="{F2836247-D755-492A-BA3E-93510ACEE91B}" type="datetimeFigureOut">
               <a:rPr lang="es-AR" smtClean="0"/>
               <a:pPr/>
-              <a:t>17/08/2013</a:t>
+              <a:t>26/08/2013</a:t>
             </a:fld>
             <a:endParaRPr lang="es-AR" dirty="0"/>
           </a:p>
@@ -2727,7 +2728,7 @@
             <a:fld id="{F2836247-D755-492A-BA3E-93510ACEE91B}" type="datetimeFigureOut">
               <a:rPr lang="es-AR" smtClean="0"/>
               <a:pPr/>
-              <a:t>17/08/2013</a:t>
+              <a:t>26/08/2013</a:t>
             </a:fld>
             <a:endParaRPr lang="es-AR" dirty="0"/>
           </a:p>
@@ -2982,7 +2983,7 @@
             <a:fld id="{F2836247-D755-492A-BA3E-93510ACEE91B}" type="datetimeFigureOut">
               <a:rPr lang="es-AR" smtClean="0"/>
               <a:pPr/>
-              <a:t>17/08/2013</a:t>
+              <a:t>26/08/2013</a:t>
             </a:fld>
             <a:endParaRPr lang="es-AR" dirty="0"/>
           </a:p>
@@ -3197,7 +3198,7 @@
             <a:fld id="{F2836247-D755-492A-BA3E-93510ACEE91B}" type="datetimeFigureOut">
               <a:rPr lang="es-AR" smtClean="0"/>
               <a:pPr/>
-              <a:t>17/08/2013</a:t>
+              <a:t>26/08/2013</a:t>
             </a:fld>
             <a:endParaRPr lang="es-AR" dirty="0"/>
           </a:p>
@@ -5748,6 +5749,2038 @@
       </p:grpSpPr>
       <p:sp>
         <p:nvSpPr>
+          <p:cNvPr id="25" name="24 Terminador"/>
+          <p:cNvSpPr/>
+          <p:nvPr/>
+        </p:nvSpPr>
+        <p:spPr>
+          <a:xfrm>
+            <a:off x="2512510" y="284488"/>
+            <a:ext cx="686590" cy="224565"/>
+          </a:xfrm>
+          <a:prstGeom prst="flowChartTerminator">
+            <a:avLst/>
+          </a:prstGeom>
+        </p:spPr>
+        <p:style>
+          <a:lnRef idx="2">
+            <a:schemeClr val="accent6">
+              <a:shade val="50000"/>
+            </a:schemeClr>
+          </a:lnRef>
+          <a:fillRef idx="1">
+            <a:schemeClr val="accent6"/>
+          </a:fillRef>
+          <a:effectRef idx="0">
+            <a:schemeClr val="accent6"/>
+          </a:effectRef>
+          <a:fontRef idx="minor">
+            <a:schemeClr val="lt1"/>
+          </a:fontRef>
+        </p:style>
+        <p:txBody>
+          <a:bodyPr lIns="91423" tIns="45711" rIns="91423" bIns="45711" rtlCol="0" anchor="ctr"/>
+          <a:lstStyle/>
+          <a:p>
+            <a:pPr algn="ctr"/>
+            <a:r>
+              <a:rPr lang="es-AR" sz="1000" dirty="0" smtClean="0"/>
+              <a:t>Inicio</a:t>
+            </a:r>
+            <a:endParaRPr lang="es-AR" sz="1100" dirty="0"/>
+          </a:p>
+        </p:txBody>
+      </p:sp>
+      <p:sp>
+        <p:nvSpPr>
+          <p:cNvPr id="40" name="39 Terminador"/>
+          <p:cNvSpPr/>
+          <p:nvPr/>
+        </p:nvSpPr>
+        <p:spPr>
+          <a:xfrm>
+            <a:off x="5667381" y="6226986"/>
+            <a:ext cx="474911" cy="224565"/>
+          </a:xfrm>
+          <a:prstGeom prst="flowChartTerminator">
+            <a:avLst/>
+          </a:prstGeom>
+        </p:spPr>
+        <p:style>
+          <a:lnRef idx="2">
+            <a:schemeClr val="accent6">
+              <a:shade val="50000"/>
+            </a:schemeClr>
+          </a:lnRef>
+          <a:fillRef idx="1">
+            <a:schemeClr val="accent6"/>
+          </a:fillRef>
+          <a:effectRef idx="0">
+            <a:schemeClr val="accent6"/>
+          </a:effectRef>
+          <a:fontRef idx="minor">
+            <a:schemeClr val="lt1"/>
+          </a:fontRef>
+        </p:style>
+        <p:txBody>
+          <a:bodyPr lIns="91423" tIns="45711" rIns="91423" bIns="45711" rtlCol="0" anchor="ctr"/>
+          <a:lstStyle/>
+          <a:p>
+            <a:pPr algn="ctr"/>
+            <a:r>
+              <a:rPr lang="es-AR" sz="1000" dirty="0" smtClean="0"/>
+              <a:t>Fin</a:t>
+            </a:r>
+            <a:endParaRPr lang="es-AR" sz="1000" dirty="0"/>
+          </a:p>
+        </p:txBody>
+      </p:sp>
+      <p:sp>
+        <p:nvSpPr>
+          <p:cNvPr id="67" name="3 Proceso"/>
+          <p:cNvSpPr/>
+          <p:nvPr/>
+        </p:nvSpPr>
+        <p:spPr>
+          <a:xfrm>
+            <a:off x="2414794" y="1062360"/>
+            <a:ext cx="882022" cy="428628"/>
+          </a:xfrm>
+          <a:prstGeom prst="flowChartProcess">
+            <a:avLst/>
+          </a:prstGeom>
+        </p:spPr>
+        <p:style>
+          <a:lnRef idx="2">
+            <a:schemeClr val="accent5">
+              <a:shade val="50000"/>
+            </a:schemeClr>
+          </a:lnRef>
+          <a:fillRef idx="1">
+            <a:schemeClr val="accent5"/>
+          </a:fillRef>
+          <a:effectRef idx="0">
+            <a:schemeClr val="accent5"/>
+          </a:effectRef>
+          <a:fontRef idx="minor">
+            <a:schemeClr val="lt1"/>
+          </a:fontRef>
+        </p:style>
+        <p:txBody>
+          <a:bodyPr lIns="91423" tIns="45711" rIns="91423" bIns="45711" rtlCol="0" anchor="ctr"/>
+          <a:lstStyle/>
+          <a:p>
+            <a:pPr algn="ctr"/>
+            <a:r>
+              <a:rPr lang="es-AR" sz="800" dirty="0" smtClean="0"/>
+              <a:t>Llegada del alumno</a:t>
+            </a:r>
+          </a:p>
+        </p:txBody>
+      </p:sp>
+      <p:sp>
+        <p:nvSpPr>
+          <p:cNvPr id="68" name="5 Decisión"/>
+          <p:cNvSpPr/>
+          <p:nvPr/>
+        </p:nvSpPr>
+        <p:spPr>
+          <a:xfrm>
+            <a:off x="2164405" y="1970619"/>
+            <a:ext cx="1420443" cy="531901"/>
+          </a:xfrm>
+          <a:prstGeom prst="flowChartDecision">
+            <a:avLst/>
+          </a:prstGeom>
+        </p:spPr>
+        <p:style>
+          <a:lnRef idx="2">
+            <a:schemeClr val="accent1">
+              <a:shade val="50000"/>
+            </a:schemeClr>
+          </a:lnRef>
+          <a:fillRef idx="1">
+            <a:schemeClr val="accent1"/>
+          </a:fillRef>
+          <a:effectRef idx="0">
+            <a:schemeClr val="accent1"/>
+          </a:effectRef>
+          <a:fontRef idx="minor">
+            <a:schemeClr val="lt1"/>
+          </a:fontRef>
+        </p:style>
+        <p:txBody>
+          <a:bodyPr lIns="91429" tIns="45714" rIns="91429" bIns="45714" rtlCol="0" anchor="ctr"/>
+          <a:lstStyle/>
+          <a:p>
+            <a:pPr algn="ctr"/>
+            <a:r>
+              <a:rPr lang="es-AR" sz="800" dirty="0" smtClean="0"/>
+              <a:t>¿Tiene paciente?</a:t>
+            </a:r>
+            <a:endParaRPr lang="es-AR" sz="800" dirty="0"/>
+          </a:p>
+        </p:txBody>
+      </p:sp>
+      <p:cxnSp>
+        <p:nvCxnSpPr>
+          <p:cNvPr id="69" name="27 Conector angular"/>
+          <p:cNvCxnSpPr>
+            <a:stCxn id="25" idx="2"/>
+            <a:endCxn id="67" idx="0"/>
+          </p:cNvCxnSpPr>
+          <p:nvPr/>
+        </p:nvCxnSpPr>
+        <p:spPr>
+          <a:xfrm rot="5400000">
+            <a:off x="2579152" y="785706"/>
+            <a:ext cx="553307" cy="12700"/>
+          </a:xfrm>
+          <a:prstGeom prst="bentConnector3">
+            <a:avLst>
+              <a:gd name="adj1" fmla="val 50000"/>
+            </a:avLst>
+          </a:prstGeom>
+          <a:ln>
+            <a:tailEnd type="arrow"/>
+          </a:ln>
+        </p:spPr>
+        <p:style>
+          <a:lnRef idx="1">
+            <a:schemeClr val="accent1"/>
+          </a:lnRef>
+          <a:fillRef idx="0">
+            <a:schemeClr val="accent1"/>
+          </a:fillRef>
+          <a:effectRef idx="0">
+            <a:schemeClr val="accent1"/>
+          </a:effectRef>
+          <a:fontRef idx="minor">
+            <a:schemeClr val="tx1"/>
+          </a:fontRef>
+        </p:style>
+      </p:cxnSp>
+      <p:cxnSp>
+        <p:nvCxnSpPr>
+          <p:cNvPr id="73" name="27 Conector angular"/>
+          <p:cNvCxnSpPr>
+            <a:stCxn id="67" idx="2"/>
+            <a:endCxn id="68" idx="0"/>
+          </p:cNvCxnSpPr>
+          <p:nvPr/>
+        </p:nvCxnSpPr>
+        <p:spPr>
+          <a:xfrm rot="16200000" flipH="1">
+            <a:off x="2625401" y="1721392"/>
+            <a:ext cx="479631" cy="18822"/>
+          </a:xfrm>
+          <a:prstGeom prst="bentConnector3">
+            <a:avLst>
+              <a:gd name="adj1" fmla="val 50000"/>
+            </a:avLst>
+          </a:prstGeom>
+          <a:ln>
+            <a:tailEnd type="arrow"/>
+          </a:ln>
+        </p:spPr>
+        <p:style>
+          <a:lnRef idx="1">
+            <a:schemeClr val="accent1"/>
+          </a:lnRef>
+          <a:fillRef idx="0">
+            <a:schemeClr val="accent1"/>
+          </a:fillRef>
+          <a:effectRef idx="0">
+            <a:schemeClr val="accent1"/>
+          </a:effectRef>
+          <a:fontRef idx="minor">
+            <a:schemeClr val="tx1"/>
+          </a:fontRef>
+        </p:style>
+      </p:cxnSp>
+      <p:sp>
+        <p:nvSpPr>
+          <p:cNvPr id="76" name="5 Decisión"/>
+          <p:cNvSpPr/>
+          <p:nvPr/>
+        </p:nvSpPr>
+        <p:spPr>
+          <a:xfrm>
+            <a:off x="6415832" y="2396680"/>
+            <a:ext cx="1656096" cy="720081"/>
+          </a:xfrm>
+          <a:prstGeom prst="flowChartDecision">
+            <a:avLst/>
+          </a:prstGeom>
+        </p:spPr>
+        <p:style>
+          <a:lnRef idx="2">
+            <a:schemeClr val="accent1">
+              <a:shade val="50000"/>
+            </a:schemeClr>
+          </a:lnRef>
+          <a:fillRef idx="1">
+            <a:schemeClr val="accent1"/>
+          </a:fillRef>
+          <a:effectRef idx="0">
+            <a:schemeClr val="accent1"/>
+          </a:effectRef>
+          <a:fontRef idx="minor">
+            <a:schemeClr val="lt1"/>
+          </a:fontRef>
+        </p:style>
+        <p:txBody>
+          <a:bodyPr lIns="91429" tIns="45714" rIns="91429" bIns="45714" rtlCol="0" anchor="ctr"/>
+          <a:lstStyle/>
+          <a:p>
+            <a:pPr algn="ctr"/>
+            <a:r>
+              <a:rPr lang="es-AR" sz="800" dirty="0" smtClean="0"/>
+              <a:t>¿Existe paciente para </a:t>
+            </a:r>
+            <a:r>
+              <a:rPr lang="es-AR" sz="800" dirty="0" err="1" smtClean="0"/>
+              <a:t>reasingnar</a:t>
+            </a:r>
+            <a:r>
+              <a:rPr lang="es-AR" sz="800" dirty="0" smtClean="0"/>
+              <a:t>?</a:t>
+            </a:r>
+            <a:endParaRPr lang="es-AR" sz="800" dirty="0"/>
+          </a:p>
+        </p:txBody>
+      </p:sp>
+      <p:sp>
+        <p:nvSpPr>
+          <p:cNvPr id="77" name="5 Decisión"/>
+          <p:cNvSpPr/>
+          <p:nvPr/>
+        </p:nvSpPr>
+        <p:spPr>
+          <a:xfrm>
+            <a:off x="1300309" y="2676129"/>
+            <a:ext cx="1420443" cy="531901"/>
+          </a:xfrm>
+          <a:prstGeom prst="flowChartDecision">
+            <a:avLst/>
+          </a:prstGeom>
+        </p:spPr>
+        <p:style>
+          <a:lnRef idx="2">
+            <a:schemeClr val="accent1">
+              <a:shade val="50000"/>
+            </a:schemeClr>
+          </a:lnRef>
+          <a:fillRef idx="1">
+            <a:schemeClr val="accent1"/>
+          </a:fillRef>
+          <a:effectRef idx="0">
+            <a:schemeClr val="accent1"/>
+          </a:effectRef>
+          <a:fontRef idx="minor">
+            <a:schemeClr val="lt1"/>
+          </a:fontRef>
+        </p:style>
+        <p:txBody>
+          <a:bodyPr lIns="91429" tIns="45714" rIns="91429" bIns="45714" rtlCol="0" anchor="ctr"/>
+          <a:lstStyle/>
+          <a:p>
+            <a:pPr algn="ctr"/>
+            <a:r>
+              <a:rPr lang="es-AR" sz="800" dirty="0" smtClean="0"/>
+              <a:t>¿Está registrado el paciente?</a:t>
+            </a:r>
+            <a:endParaRPr lang="es-AR" sz="800" dirty="0"/>
+          </a:p>
+        </p:txBody>
+      </p:sp>
+      <p:grpSp>
+        <p:nvGrpSpPr>
+          <p:cNvPr id="35" name="Grupo 34"/>
+          <p:cNvGrpSpPr/>
+          <p:nvPr/>
+        </p:nvGrpSpPr>
+        <p:grpSpPr>
+          <a:xfrm>
+            <a:off x="1931514" y="1970618"/>
+            <a:ext cx="357190" cy="705510"/>
+            <a:chOff x="1931514" y="1970618"/>
+            <a:chExt cx="357190" cy="705510"/>
+          </a:xfrm>
+        </p:grpSpPr>
+        <p:cxnSp>
+          <p:nvCxnSpPr>
+            <p:cNvPr id="78" name="27 Conector angular"/>
+            <p:cNvCxnSpPr>
+              <a:stCxn id="68" idx="1"/>
+              <a:endCxn id="77" idx="0"/>
+            </p:cNvCxnSpPr>
+            <p:nvPr/>
+          </p:nvCxnSpPr>
+          <p:spPr>
+            <a:xfrm rot="10800000" flipV="1">
+              <a:off x="2010531" y="2236569"/>
+              <a:ext cx="153874" cy="439559"/>
+            </a:xfrm>
+            <a:prstGeom prst="bentConnector2">
+              <a:avLst/>
+            </a:prstGeom>
+            <a:ln>
+              <a:tailEnd type="arrow"/>
+            </a:ln>
+          </p:spPr>
+          <p:style>
+            <a:lnRef idx="1">
+              <a:schemeClr val="accent1"/>
+            </a:lnRef>
+            <a:fillRef idx="0">
+              <a:schemeClr val="accent1"/>
+            </a:fillRef>
+            <a:effectRef idx="0">
+              <a:schemeClr val="accent1"/>
+            </a:effectRef>
+            <a:fontRef idx="minor">
+              <a:schemeClr val="tx1"/>
+            </a:fontRef>
+          </p:style>
+        </p:cxnSp>
+        <p:sp>
+          <p:nvSpPr>
+            <p:cNvPr id="80" name="20 CuadroTexto"/>
+            <p:cNvSpPr txBox="1"/>
+            <p:nvPr/>
+          </p:nvSpPr>
+          <p:spPr>
+            <a:xfrm>
+              <a:off x="1931514" y="1970618"/>
+              <a:ext cx="357190" cy="261598"/>
+            </a:xfrm>
+            <a:prstGeom prst="rect">
+              <a:avLst/>
+            </a:prstGeom>
+            <a:noFill/>
+          </p:spPr>
+          <p:txBody>
+            <a:bodyPr wrap="square" lIns="91429" tIns="45714" rIns="91429" bIns="45714" rtlCol="0">
+              <a:spAutoFit/>
+            </a:bodyPr>
+            <a:lstStyle/>
+            <a:p>
+              <a:r>
+                <a:rPr lang="es-AR" sz="1100" dirty="0" smtClean="0"/>
+                <a:t>SI</a:t>
+              </a:r>
+              <a:endParaRPr lang="es-AR" dirty="0"/>
+            </a:p>
+          </p:txBody>
+        </p:sp>
+      </p:grpSp>
+      <p:grpSp>
+        <p:nvGrpSpPr>
+          <p:cNvPr id="82" name="Grupo 81"/>
+          <p:cNvGrpSpPr/>
+          <p:nvPr/>
+        </p:nvGrpSpPr>
+        <p:grpSpPr>
+          <a:xfrm>
+            <a:off x="3584848" y="1970618"/>
+            <a:ext cx="3659032" cy="426062"/>
+            <a:chOff x="436214" y="1818218"/>
+            <a:chExt cx="3659032" cy="426062"/>
+          </a:xfrm>
+        </p:grpSpPr>
+        <p:cxnSp>
+          <p:nvCxnSpPr>
+            <p:cNvPr id="83" name="27 Conector angular"/>
+            <p:cNvCxnSpPr>
+              <a:stCxn id="68" idx="3"/>
+              <a:endCxn id="76" idx="0"/>
+            </p:cNvCxnSpPr>
+            <p:nvPr/>
+          </p:nvCxnSpPr>
+          <p:spPr>
+            <a:xfrm>
+              <a:off x="436214" y="2084170"/>
+              <a:ext cx="3659032" cy="160110"/>
+            </a:xfrm>
+            <a:prstGeom prst="bentConnector2">
+              <a:avLst/>
+            </a:prstGeom>
+            <a:ln>
+              <a:tailEnd type="arrow"/>
+            </a:ln>
+          </p:spPr>
+          <p:style>
+            <a:lnRef idx="1">
+              <a:schemeClr val="accent1"/>
+            </a:lnRef>
+            <a:fillRef idx="0">
+              <a:schemeClr val="accent1"/>
+            </a:fillRef>
+            <a:effectRef idx="0">
+              <a:schemeClr val="accent1"/>
+            </a:effectRef>
+            <a:fontRef idx="minor">
+              <a:schemeClr val="tx1"/>
+            </a:fontRef>
+          </p:style>
+        </p:cxnSp>
+        <p:sp>
+          <p:nvSpPr>
+            <p:cNvPr id="84" name="20 CuadroTexto"/>
+            <p:cNvSpPr txBox="1"/>
+            <p:nvPr/>
+          </p:nvSpPr>
+          <p:spPr>
+            <a:xfrm>
+              <a:off x="1544012" y="1818218"/>
+              <a:ext cx="366242" cy="261598"/>
+            </a:xfrm>
+            <a:prstGeom prst="rect">
+              <a:avLst/>
+            </a:prstGeom>
+            <a:noFill/>
+          </p:spPr>
+          <p:txBody>
+            <a:bodyPr wrap="square" lIns="91429" tIns="45714" rIns="91429" bIns="45714" rtlCol="0">
+              <a:spAutoFit/>
+            </a:bodyPr>
+            <a:lstStyle/>
+            <a:p>
+              <a:r>
+                <a:rPr lang="es-AR" sz="1100" dirty="0" smtClean="0"/>
+                <a:t>NO</a:t>
+              </a:r>
+              <a:endParaRPr lang="es-AR" dirty="0"/>
+            </a:p>
+          </p:txBody>
+        </p:sp>
+      </p:grpSp>
+      <p:sp>
+        <p:nvSpPr>
+          <p:cNvPr id="90" name="3 Proceso"/>
+          <p:cNvSpPr/>
+          <p:nvPr/>
+        </p:nvSpPr>
+        <p:spPr>
+          <a:xfrm>
+            <a:off x="7958486" y="3549510"/>
+            <a:ext cx="882022" cy="428628"/>
+          </a:xfrm>
+          <a:prstGeom prst="flowChartProcess">
+            <a:avLst/>
+          </a:prstGeom>
+        </p:spPr>
+        <p:style>
+          <a:lnRef idx="2">
+            <a:schemeClr val="accent5">
+              <a:shade val="50000"/>
+            </a:schemeClr>
+          </a:lnRef>
+          <a:fillRef idx="1">
+            <a:schemeClr val="accent5"/>
+          </a:fillRef>
+          <a:effectRef idx="0">
+            <a:schemeClr val="accent5"/>
+          </a:effectRef>
+          <a:fontRef idx="minor">
+            <a:schemeClr val="lt1"/>
+          </a:fontRef>
+        </p:style>
+        <p:txBody>
+          <a:bodyPr lIns="91423" tIns="45711" rIns="91423" bIns="45711" rtlCol="0" anchor="ctr"/>
+          <a:lstStyle/>
+          <a:p>
+            <a:pPr algn="ctr"/>
+            <a:r>
+              <a:rPr lang="es-AR" sz="800" dirty="0" smtClean="0"/>
+              <a:t>No  puede realizar practica</a:t>
+            </a:r>
+          </a:p>
+        </p:txBody>
+      </p:sp>
+      <p:grpSp>
+        <p:nvGrpSpPr>
+          <p:cNvPr id="93" name="Grupo 92"/>
+          <p:cNvGrpSpPr/>
+          <p:nvPr/>
+        </p:nvGrpSpPr>
+        <p:grpSpPr>
+          <a:xfrm>
+            <a:off x="7958486" y="2526671"/>
+            <a:ext cx="441011" cy="1022839"/>
+            <a:chOff x="4657452" y="2221871"/>
+            <a:chExt cx="441011" cy="1022839"/>
+          </a:xfrm>
+        </p:grpSpPr>
+        <p:cxnSp>
+          <p:nvCxnSpPr>
+            <p:cNvPr id="95" name="27 Conector angular"/>
+            <p:cNvCxnSpPr>
+              <a:stCxn id="76" idx="3"/>
+              <a:endCxn id="90" idx="0"/>
+            </p:cNvCxnSpPr>
+            <p:nvPr/>
+          </p:nvCxnSpPr>
+          <p:spPr>
+            <a:xfrm>
+              <a:off x="4770894" y="2451921"/>
+              <a:ext cx="327569" cy="792789"/>
+            </a:xfrm>
+            <a:prstGeom prst="bentConnector2">
+              <a:avLst/>
+            </a:prstGeom>
+            <a:ln>
+              <a:tailEnd type="arrow"/>
+            </a:ln>
+          </p:spPr>
+          <p:style>
+            <a:lnRef idx="1">
+              <a:schemeClr val="accent1"/>
+            </a:lnRef>
+            <a:fillRef idx="0">
+              <a:schemeClr val="accent1"/>
+            </a:fillRef>
+            <a:effectRef idx="0">
+              <a:schemeClr val="accent1"/>
+            </a:effectRef>
+            <a:fontRef idx="minor">
+              <a:schemeClr val="tx1"/>
+            </a:fontRef>
+          </p:style>
+        </p:cxnSp>
+        <p:sp>
+          <p:nvSpPr>
+            <p:cNvPr id="96" name="20 CuadroTexto"/>
+            <p:cNvSpPr txBox="1"/>
+            <p:nvPr/>
+          </p:nvSpPr>
+          <p:spPr>
+            <a:xfrm>
+              <a:off x="4657452" y="2221871"/>
+              <a:ext cx="366242" cy="261598"/>
+            </a:xfrm>
+            <a:prstGeom prst="rect">
+              <a:avLst/>
+            </a:prstGeom>
+            <a:noFill/>
+          </p:spPr>
+          <p:txBody>
+            <a:bodyPr wrap="square" lIns="91429" tIns="45714" rIns="91429" bIns="45714" rtlCol="0">
+              <a:spAutoFit/>
+            </a:bodyPr>
+            <a:lstStyle/>
+            <a:p>
+              <a:r>
+                <a:rPr lang="es-AR" sz="1100" dirty="0" smtClean="0"/>
+                <a:t>NO</a:t>
+              </a:r>
+              <a:endParaRPr lang="es-AR" dirty="0"/>
+            </a:p>
+          </p:txBody>
+        </p:sp>
+      </p:grpSp>
+      <p:cxnSp>
+        <p:nvCxnSpPr>
+          <p:cNvPr id="97" name="27 Conector angular"/>
+          <p:cNvCxnSpPr>
+            <a:stCxn id="90" idx="2"/>
+            <a:endCxn id="40" idx="3"/>
+          </p:cNvCxnSpPr>
+          <p:nvPr/>
+        </p:nvCxnSpPr>
+        <p:spPr>
+          <a:xfrm rot="5400000">
+            <a:off x="6090330" y="4030101"/>
+            <a:ext cx="2361131" cy="2257205"/>
+          </a:xfrm>
+          <a:prstGeom prst="bentConnector2">
+            <a:avLst/>
+          </a:prstGeom>
+          <a:ln>
+            <a:tailEnd type="arrow"/>
+          </a:ln>
+        </p:spPr>
+        <p:style>
+          <a:lnRef idx="1">
+            <a:schemeClr val="accent1"/>
+          </a:lnRef>
+          <a:fillRef idx="0">
+            <a:schemeClr val="accent1"/>
+          </a:fillRef>
+          <a:effectRef idx="0">
+            <a:schemeClr val="accent1"/>
+          </a:effectRef>
+          <a:fontRef idx="minor">
+            <a:schemeClr val="tx1"/>
+          </a:fontRef>
+        </p:style>
+      </p:cxnSp>
+      <p:grpSp>
+        <p:nvGrpSpPr>
+          <p:cNvPr id="102" name="Grupo 101"/>
+          <p:cNvGrpSpPr/>
+          <p:nvPr/>
+        </p:nvGrpSpPr>
+        <p:grpSpPr>
+          <a:xfrm>
+            <a:off x="954369" y="2718544"/>
+            <a:ext cx="398231" cy="565016"/>
+            <a:chOff x="2096640" y="1826602"/>
+            <a:chExt cx="398231" cy="565016"/>
+          </a:xfrm>
+        </p:grpSpPr>
+        <p:cxnSp>
+          <p:nvCxnSpPr>
+            <p:cNvPr id="103" name="27 Conector angular"/>
+            <p:cNvCxnSpPr>
+              <a:stCxn id="77" idx="1"/>
+              <a:endCxn id="112" idx="0"/>
+            </p:cNvCxnSpPr>
+            <p:nvPr/>
+          </p:nvCxnSpPr>
+          <p:spPr>
+            <a:xfrm rot="10800000" flipV="1">
+              <a:off x="2096640" y="2050138"/>
+              <a:ext cx="345941" cy="341480"/>
+            </a:xfrm>
+            <a:prstGeom prst="bentConnector2">
+              <a:avLst/>
+            </a:prstGeom>
+            <a:ln>
+              <a:tailEnd type="arrow"/>
+            </a:ln>
+          </p:spPr>
+          <p:style>
+            <a:lnRef idx="1">
+              <a:schemeClr val="accent1"/>
+            </a:lnRef>
+            <a:fillRef idx="0">
+              <a:schemeClr val="accent1"/>
+            </a:fillRef>
+            <a:effectRef idx="0">
+              <a:schemeClr val="accent1"/>
+            </a:effectRef>
+            <a:fontRef idx="minor">
+              <a:schemeClr val="tx1"/>
+            </a:fontRef>
+          </p:style>
+        </p:cxnSp>
+        <p:sp>
+          <p:nvSpPr>
+            <p:cNvPr id="104" name="20 CuadroTexto"/>
+            <p:cNvSpPr txBox="1"/>
+            <p:nvPr/>
+          </p:nvSpPr>
+          <p:spPr>
+            <a:xfrm>
+              <a:off x="2137681" y="1826602"/>
+              <a:ext cx="357190" cy="261598"/>
+            </a:xfrm>
+            <a:prstGeom prst="rect">
+              <a:avLst/>
+            </a:prstGeom>
+            <a:noFill/>
+          </p:spPr>
+          <p:txBody>
+            <a:bodyPr wrap="square" lIns="91429" tIns="45714" rIns="91429" bIns="45714" rtlCol="0">
+              <a:spAutoFit/>
+            </a:bodyPr>
+            <a:lstStyle/>
+            <a:p>
+              <a:r>
+                <a:rPr lang="es-AR" sz="1100" dirty="0" smtClean="0"/>
+                <a:t>SI</a:t>
+              </a:r>
+              <a:endParaRPr lang="es-AR" dirty="0"/>
+            </a:p>
+          </p:txBody>
+        </p:sp>
+      </p:grpSp>
+      <p:sp>
+        <p:nvSpPr>
+          <p:cNvPr id="111" name="3 Proceso"/>
+          <p:cNvSpPr>
+            <a:spLocks/>
+          </p:cNvSpPr>
+          <p:nvPr/>
+        </p:nvSpPr>
+        <p:spPr>
+          <a:xfrm>
+            <a:off x="418287" y="4606917"/>
+            <a:ext cx="882022" cy="428628"/>
+          </a:xfrm>
+          <a:prstGeom prst="flowChartProcess">
+            <a:avLst/>
+          </a:prstGeom>
+        </p:spPr>
+        <p:style>
+          <a:lnRef idx="2">
+            <a:schemeClr val="accent5">
+              <a:shade val="50000"/>
+            </a:schemeClr>
+          </a:lnRef>
+          <a:fillRef idx="1">
+            <a:schemeClr val="accent5"/>
+          </a:fillRef>
+          <a:effectRef idx="0">
+            <a:schemeClr val="accent5"/>
+          </a:effectRef>
+          <a:fontRef idx="minor">
+            <a:schemeClr val="lt1"/>
+          </a:fontRef>
+        </p:style>
+        <p:txBody>
+          <a:bodyPr lIns="91423" tIns="45711" rIns="91423" bIns="45711" rtlCol="0" anchor="ctr"/>
+          <a:lstStyle/>
+          <a:p>
+            <a:pPr algn="ctr"/>
+            <a:r>
+              <a:rPr lang="es-AR" sz="800" dirty="0" smtClean="0"/>
+              <a:t>Autorización de la práctica</a:t>
+            </a:r>
+          </a:p>
+        </p:txBody>
+      </p:sp>
+      <p:sp>
+        <p:nvSpPr>
+          <p:cNvPr id="112" name="5 Decisión"/>
+          <p:cNvSpPr/>
+          <p:nvPr/>
+        </p:nvSpPr>
+        <p:spPr>
+          <a:xfrm>
+            <a:off x="244146" y="3283560"/>
+            <a:ext cx="1420443" cy="531901"/>
+          </a:xfrm>
+          <a:prstGeom prst="flowChartDecision">
+            <a:avLst/>
+          </a:prstGeom>
+        </p:spPr>
+        <p:style>
+          <a:lnRef idx="2">
+            <a:schemeClr val="accent1">
+              <a:shade val="50000"/>
+            </a:schemeClr>
+          </a:lnRef>
+          <a:fillRef idx="1">
+            <a:schemeClr val="accent1"/>
+          </a:fillRef>
+          <a:effectRef idx="0">
+            <a:schemeClr val="accent1"/>
+          </a:effectRef>
+          <a:fontRef idx="minor">
+            <a:schemeClr val="lt1"/>
+          </a:fontRef>
+        </p:style>
+        <p:txBody>
+          <a:bodyPr lIns="91429" tIns="45714" rIns="91429" bIns="45714" rtlCol="0" anchor="ctr"/>
+          <a:lstStyle/>
+          <a:p>
+            <a:pPr algn="ctr"/>
+            <a:r>
+              <a:rPr lang="es-AR" sz="800" dirty="0" smtClean="0"/>
+              <a:t>¿Está asignado el paciente?</a:t>
+            </a:r>
+            <a:endParaRPr lang="es-AR" sz="800" dirty="0"/>
+          </a:p>
+        </p:txBody>
+      </p:sp>
+      <p:grpSp>
+        <p:nvGrpSpPr>
+          <p:cNvPr id="117" name="Grupo 116"/>
+          <p:cNvGrpSpPr/>
+          <p:nvPr/>
+        </p:nvGrpSpPr>
+        <p:grpSpPr>
+          <a:xfrm>
+            <a:off x="336726" y="3815462"/>
+            <a:ext cx="617642" cy="1005770"/>
+            <a:chOff x="1901188" y="1699384"/>
+            <a:chExt cx="617642" cy="1005770"/>
+          </a:xfrm>
+        </p:grpSpPr>
+        <p:cxnSp>
+          <p:nvCxnSpPr>
+            <p:cNvPr id="118" name="27 Conector angular"/>
+            <p:cNvCxnSpPr>
+              <a:stCxn id="112" idx="2"/>
+              <a:endCxn id="111" idx="1"/>
+            </p:cNvCxnSpPr>
+            <p:nvPr/>
+          </p:nvCxnSpPr>
+          <p:spPr>
+            <a:xfrm rot="5400000">
+              <a:off x="1747905" y="1934228"/>
+              <a:ext cx="1005770" cy="536081"/>
+            </a:xfrm>
+            <a:prstGeom prst="bentConnector4">
+              <a:avLst>
+                <a:gd name="adj1" fmla="val 39346"/>
+                <a:gd name="adj2" fmla="val 142643"/>
+              </a:avLst>
+            </a:prstGeom>
+            <a:ln>
+              <a:tailEnd type="arrow"/>
+            </a:ln>
+          </p:spPr>
+          <p:style>
+            <a:lnRef idx="1">
+              <a:schemeClr val="accent1"/>
+            </a:lnRef>
+            <a:fillRef idx="0">
+              <a:schemeClr val="accent1"/>
+            </a:fillRef>
+            <a:effectRef idx="0">
+              <a:schemeClr val="accent1"/>
+            </a:effectRef>
+            <a:fontRef idx="minor">
+              <a:schemeClr val="tx1"/>
+            </a:fontRef>
+          </p:style>
+        </p:cxnSp>
+        <p:sp>
+          <p:nvSpPr>
+            <p:cNvPr id="120" name="20 CuadroTexto"/>
+            <p:cNvSpPr txBox="1"/>
+            <p:nvPr/>
+          </p:nvSpPr>
+          <p:spPr>
+            <a:xfrm>
+              <a:off x="1901188" y="1856667"/>
+              <a:ext cx="357190" cy="261598"/>
+            </a:xfrm>
+            <a:prstGeom prst="rect">
+              <a:avLst/>
+            </a:prstGeom>
+            <a:noFill/>
+          </p:spPr>
+          <p:txBody>
+            <a:bodyPr wrap="square" lIns="91429" tIns="45714" rIns="91429" bIns="45714" rtlCol="0">
+              <a:spAutoFit/>
+            </a:bodyPr>
+            <a:lstStyle/>
+            <a:p>
+              <a:r>
+                <a:rPr lang="es-AR" sz="1100" dirty="0" smtClean="0"/>
+                <a:t>SI</a:t>
+              </a:r>
+              <a:endParaRPr lang="es-AR" dirty="0"/>
+            </a:p>
+          </p:txBody>
+        </p:sp>
+      </p:grpSp>
+      <p:sp>
+        <p:nvSpPr>
+          <p:cNvPr id="122" name="5 Decisión"/>
+          <p:cNvSpPr/>
+          <p:nvPr/>
+        </p:nvSpPr>
+        <p:spPr>
+          <a:xfrm>
+            <a:off x="573219" y="5323628"/>
+            <a:ext cx="1420443" cy="531901"/>
+          </a:xfrm>
+          <a:prstGeom prst="flowChartDecision">
+            <a:avLst/>
+          </a:prstGeom>
+        </p:spPr>
+        <p:style>
+          <a:lnRef idx="2">
+            <a:schemeClr val="accent1">
+              <a:shade val="50000"/>
+            </a:schemeClr>
+          </a:lnRef>
+          <a:fillRef idx="1">
+            <a:schemeClr val="accent1"/>
+          </a:fillRef>
+          <a:effectRef idx="0">
+            <a:schemeClr val="accent1"/>
+          </a:effectRef>
+          <a:fontRef idx="minor">
+            <a:schemeClr val="lt1"/>
+          </a:fontRef>
+        </p:style>
+        <p:txBody>
+          <a:bodyPr lIns="91429" tIns="45714" rIns="91429" bIns="45714" rtlCol="0" anchor="ctr"/>
+          <a:lstStyle/>
+          <a:p>
+            <a:pPr algn="ctr"/>
+            <a:r>
+              <a:rPr lang="es-AR" sz="800" dirty="0" smtClean="0"/>
+              <a:t>¿Práctica autorizada?</a:t>
+            </a:r>
+            <a:endParaRPr lang="es-AR" sz="800" dirty="0"/>
+          </a:p>
+        </p:txBody>
+      </p:sp>
+      <p:cxnSp>
+        <p:nvCxnSpPr>
+          <p:cNvPr id="123" name="27 Conector angular"/>
+          <p:cNvCxnSpPr>
+            <a:stCxn id="111" idx="2"/>
+            <a:endCxn id="122" idx="0"/>
+          </p:cNvCxnSpPr>
+          <p:nvPr/>
+        </p:nvCxnSpPr>
+        <p:spPr>
+          <a:xfrm rot="16200000" flipH="1">
+            <a:off x="927328" y="4967514"/>
+            <a:ext cx="288083" cy="424143"/>
+          </a:xfrm>
+          <a:prstGeom prst="bentConnector3">
+            <a:avLst>
+              <a:gd name="adj1" fmla="val 50000"/>
+            </a:avLst>
+          </a:prstGeom>
+          <a:ln>
+            <a:tailEnd type="arrow"/>
+          </a:ln>
+        </p:spPr>
+        <p:style>
+          <a:lnRef idx="1">
+            <a:schemeClr val="accent1"/>
+          </a:lnRef>
+          <a:fillRef idx="0">
+            <a:schemeClr val="accent1"/>
+          </a:fillRef>
+          <a:effectRef idx="0">
+            <a:schemeClr val="accent1"/>
+          </a:effectRef>
+          <a:fontRef idx="minor">
+            <a:schemeClr val="tx1"/>
+          </a:fontRef>
+        </p:style>
+      </p:cxnSp>
+      <p:grpSp>
+        <p:nvGrpSpPr>
+          <p:cNvPr id="127" name="Grupo 126"/>
+          <p:cNvGrpSpPr/>
+          <p:nvPr/>
+        </p:nvGrpSpPr>
+        <p:grpSpPr>
+          <a:xfrm>
+            <a:off x="923402" y="5855528"/>
+            <a:ext cx="360040" cy="607431"/>
+            <a:chOff x="2137681" y="1679063"/>
+            <a:chExt cx="360040" cy="607431"/>
+          </a:xfrm>
+        </p:grpSpPr>
+        <p:cxnSp>
+          <p:nvCxnSpPr>
+            <p:cNvPr id="128" name="27 Conector angular"/>
+            <p:cNvCxnSpPr>
+              <a:stCxn id="122" idx="2"/>
+              <a:endCxn id="131" idx="0"/>
+            </p:cNvCxnSpPr>
+            <p:nvPr/>
+          </p:nvCxnSpPr>
+          <p:spPr>
+            <a:xfrm rot="5400000">
+              <a:off x="2161058" y="1949832"/>
+              <a:ext cx="607431" cy="65894"/>
+            </a:xfrm>
+            <a:prstGeom prst="bentConnector3">
+              <a:avLst>
+                <a:gd name="adj1" fmla="val 50000"/>
+              </a:avLst>
+            </a:prstGeom>
+            <a:ln>
+              <a:tailEnd type="arrow"/>
+            </a:ln>
+          </p:spPr>
+          <p:style>
+            <a:lnRef idx="1">
+              <a:schemeClr val="accent1"/>
+            </a:lnRef>
+            <a:fillRef idx="0">
+              <a:schemeClr val="accent1"/>
+            </a:fillRef>
+            <a:effectRef idx="0">
+              <a:schemeClr val="accent1"/>
+            </a:effectRef>
+            <a:fontRef idx="minor">
+              <a:schemeClr val="tx1"/>
+            </a:fontRef>
+          </p:style>
+        </p:cxnSp>
+        <p:sp>
+          <p:nvSpPr>
+            <p:cNvPr id="129" name="20 CuadroTexto"/>
+            <p:cNvSpPr txBox="1"/>
+            <p:nvPr/>
+          </p:nvSpPr>
+          <p:spPr>
+            <a:xfrm>
+              <a:off x="2137681" y="1826602"/>
+              <a:ext cx="357190" cy="261598"/>
+            </a:xfrm>
+            <a:prstGeom prst="rect">
+              <a:avLst/>
+            </a:prstGeom>
+            <a:noFill/>
+          </p:spPr>
+          <p:txBody>
+            <a:bodyPr wrap="square" lIns="91429" tIns="45714" rIns="91429" bIns="45714" rtlCol="0">
+              <a:spAutoFit/>
+            </a:bodyPr>
+            <a:lstStyle/>
+            <a:p>
+              <a:r>
+                <a:rPr lang="es-AR" sz="1100" dirty="0" smtClean="0"/>
+                <a:t>SI</a:t>
+              </a:r>
+              <a:endParaRPr lang="es-AR" dirty="0"/>
+            </a:p>
+          </p:txBody>
+        </p:sp>
+      </p:grpSp>
+      <p:sp>
+        <p:nvSpPr>
+          <p:cNvPr id="131" name="3 Proceso"/>
+          <p:cNvSpPr/>
+          <p:nvPr/>
+        </p:nvSpPr>
+        <p:spPr>
+          <a:xfrm>
+            <a:off x="776536" y="6462960"/>
+            <a:ext cx="882022" cy="428628"/>
+          </a:xfrm>
+          <a:prstGeom prst="flowChartProcess">
+            <a:avLst/>
+          </a:prstGeom>
+        </p:spPr>
+        <p:style>
+          <a:lnRef idx="2">
+            <a:schemeClr val="accent5">
+              <a:shade val="50000"/>
+            </a:schemeClr>
+          </a:lnRef>
+          <a:fillRef idx="1">
+            <a:schemeClr val="accent5"/>
+          </a:fillRef>
+          <a:effectRef idx="0">
+            <a:schemeClr val="accent5"/>
+          </a:effectRef>
+          <a:fontRef idx="minor">
+            <a:schemeClr val="lt1"/>
+          </a:fontRef>
+        </p:style>
+        <p:txBody>
+          <a:bodyPr lIns="91423" tIns="45711" rIns="91423" bIns="45711" rtlCol="0" anchor="ctr"/>
+          <a:lstStyle/>
+          <a:p>
+            <a:pPr algn="ctr"/>
+            <a:r>
+              <a:rPr lang="es-AR" sz="800" dirty="0" smtClean="0"/>
+              <a:t>Autorización de la práctica</a:t>
+            </a:r>
+          </a:p>
+        </p:txBody>
+      </p:sp>
+      <p:sp>
+        <p:nvSpPr>
+          <p:cNvPr id="132" name="3 Proceso"/>
+          <p:cNvSpPr/>
+          <p:nvPr/>
+        </p:nvSpPr>
+        <p:spPr>
+          <a:xfrm>
+            <a:off x="2198770" y="6462960"/>
+            <a:ext cx="882022" cy="428628"/>
+          </a:xfrm>
+          <a:prstGeom prst="flowChartProcess">
+            <a:avLst/>
+          </a:prstGeom>
+        </p:spPr>
+        <p:style>
+          <a:lnRef idx="2">
+            <a:schemeClr val="accent5">
+              <a:shade val="50000"/>
+            </a:schemeClr>
+          </a:lnRef>
+          <a:fillRef idx="1">
+            <a:schemeClr val="accent5"/>
+          </a:fillRef>
+          <a:effectRef idx="0">
+            <a:schemeClr val="accent5"/>
+          </a:effectRef>
+          <a:fontRef idx="minor">
+            <a:schemeClr val="lt1"/>
+          </a:fontRef>
+        </p:style>
+        <p:txBody>
+          <a:bodyPr lIns="91423" tIns="45711" rIns="91423" bIns="45711" rtlCol="0" anchor="ctr"/>
+          <a:lstStyle/>
+          <a:p>
+            <a:pPr algn="ctr"/>
+            <a:r>
+              <a:rPr lang="es-AR" sz="800" dirty="0" smtClean="0"/>
+              <a:t>Actualizar HC</a:t>
+            </a:r>
+          </a:p>
+        </p:txBody>
+      </p:sp>
+      <p:cxnSp>
+        <p:nvCxnSpPr>
+          <p:cNvPr id="134" name="27 Conector angular"/>
+          <p:cNvCxnSpPr>
+            <a:stCxn id="131" idx="3"/>
+            <a:endCxn id="132" idx="1"/>
+          </p:cNvCxnSpPr>
+          <p:nvPr/>
+        </p:nvCxnSpPr>
+        <p:spPr>
+          <a:xfrm>
+            <a:off x="1658558" y="6677274"/>
+            <a:ext cx="540212" cy="12700"/>
+          </a:xfrm>
+          <a:prstGeom prst="bentConnector3">
+            <a:avLst>
+              <a:gd name="adj1" fmla="val 50000"/>
+            </a:avLst>
+          </a:prstGeom>
+          <a:ln>
+            <a:tailEnd type="arrow"/>
+          </a:ln>
+        </p:spPr>
+        <p:style>
+          <a:lnRef idx="1">
+            <a:schemeClr val="accent1"/>
+          </a:lnRef>
+          <a:fillRef idx="0">
+            <a:schemeClr val="accent1"/>
+          </a:fillRef>
+          <a:effectRef idx="0">
+            <a:schemeClr val="accent1"/>
+          </a:effectRef>
+          <a:fontRef idx="minor">
+            <a:schemeClr val="tx1"/>
+          </a:fontRef>
+        </p:style>
+      </p:cxnSp>
+      <p:sp>
+        <p:nvSpPr>
+          <p:cNvPr id="74" name="Documento 73"/>
+          <p:cNvSpPr/>
+          <p:nvPr/>
+        </p:nvSpPr>
+        <p:spPr>
+          <a:xfrm>
+            <a:off x="3705255" y="6451551"/>
+            <a:ext cx="914400" cy="612648"/>
+          </a:xfrm>
+          <a:prstGeom prst="flowChartDocument">
+            <a:avLst/>
+          </a:prstGeom>
+        </p:spPr>
+        <p:style>
+          <a:lnRef idx="2">
+            <a:schemeClr val="accent5">
+              <a:shade val="50000"/>
+            </a:schemeClr>
+          </a:lnRef>
+          <a:fillRef idx="1">
+            <a:schemeClr val="accent5"/>
+          </a:fillRef>
+          <a:effectRef idx="0">
+            <a:schemeClr val="accent5"/>
+          </a:effectRef>
+          <a:fontRef idx="minor">
+            <a:schemeClr val="lt1"/>
+          </a:fontRef>
+        </p:style>
+        <p:txBody>
+          <a:bodyPr lIns="91423" tIns="45711" rIns="91423" bIns="45711" rtlCol="0" anchor="ctr"/>
+          <a:lstStyle/>
+          <a:p>
+            <a:pPr algn="ctr"/>
+            <a:r>
+              <a:rPr lang="es-AR" sz="800" dirty="0"/>
+              <a:t>HC Actualizada</a:t>
+            </a:r>
+          </a:p>
+        </p:txBody>
+      </p:sp>
+      <p:cxnSp>
+        <p:nvCxnSpPr>
+          <p:cNvPr id="140" name="27 Conector angular"/>
+          <p:cNvCxnSpPr>
+            <a:stCxn id="132" idx="3"/>
+            <a:endCxn id="74" idx="1"/>
+          </p:cNvCxnSpPr>
+          <p:nvPr/>
+        </p:nvCxnSpPr>
+        <p:spPr>
+          <a:xfrm>
+            <a:off x="3080792" y="6677274"/>
+            <a:ext cx="624463" cy="80601"/>
+          </a:xfrm>
+          <a:prstGeom prst="bentConnector3">
+            <a:avLst>
+              <a:gd name="adj1" fmla="val 50000"/>
+            </a:avLst>
+          </a:prstGeom>
+          <a:ln>
+            <a:tailEnd type="arrow"/>
+          </a:ln>
+        </p:spPr>
+        <p:style>
+          <a:lnRef idx="1">
+            <a:schemeClr val="accent1"/>
+          </a:lnRef>
+          <a:fillRef idx="0">
+            <a:schemeClr val="accent1"/>
+          </a:fillRef>
+          <a:effectRef idx="0">
+            <a:schemeClr val="accent1"/>
+          </a:effectRef>
+          <a:fontRef idx="minor">
+            <a:schemeClr val="tx1"/>
+          </a:fontRef>
+        </p:style>
+      </p:cxnSp>
+      <p:cxnSp>
+        <p:nvCxnSpPr>
+          <p:cNvPr id="141" name="27 Conector angular"/>
+          <p:cNvCxnSpPr>
+            <a:stCxn id="74" idx="3"/>
+            <a:endCxn id="40" idx="1"/>
+          </p:cNvCxnSpPr>
+          <p:nvPr/>
+        </p:nvCxnSpPr>
+        <p:spPr>
+          <a:xfrm flipV="1">
+            <a:off x="4619655" y="6339269"/>
+            <a:ext cx="1047726" cy="418606"/>
+          </a:xfrm>
+          <a:prstGeom prst="bentConnector3">
+            <a:avLst>
+              <a:gd name="adj1" fmla="val 50000"/>
+            </a:avLst>
+          </a:prstGeom>
+          <a:ln>
+            <a:tailEnd type="arrow"/>
+          </a:ln>
+        </p:spPr>
+        <p:style>
+          <a:lnRef idx="1">
+            <a:schemeClr val="accent1"/>
+          </a:lnRef>
+          <a:fillRef idx="0">
+            <a:schemeClr val="accent1"/>
+          </a:fillRef>
+          <a:effectRef idx="0">
+            <a:schemeClr val="accent1"/>
+          </a:effectRef>
+          <a:fontRef idx="minor">
+            <a:schemeClr val="tx1"/>
+          </a:fontRef>
+        </p:style>
+      </p:cxnSp>
+      <p:sp>
+        <p:nvSpPr>
+          <p:cNvPr id="145" name="3 Proceso"/>
+          <p:cNvSpPr/>
+          <p:nvPr/>
+        </p:nvSpPr>
+        <p:spPr>
+          <a:xfrm>
+            <a:off x="3326899" y="2720878"/>
+            <a:ext cx="882022" cy="428628"/>
+          </a:xfrm>
+          <a:prstGeom prst="flowChartProcess">
+            <a:avLst/>
+          </a:prstGeom>
+        </p:spPr>
+        <p:style>
+          <a:lnRef idx="2">
+            <a:schemeClr val="accent2">
+              <a:shade val="50000"/>
+            </a:schemeClr>
+          </a:lnRef>
+          <a:fillRef idx="1">
+            <a:schemeClr val="accent2"/>
+          </a:fillRef>
+          <a:effectRef idx="0">
+            <a:schemeClr val="accent2"/>
+          </a:effectRef>
+          <a:fontRef idx="minor">
+            <a:schemeClr val="lt1"/>
+          </a:fontRef>
+        </p:style>
+        <p:txBody>
+          <a:bodyPr lIns="91423" tIns="45711" rIns="91423" bIns="45711" rtlCol="0" anchor="ctr"/>
+          <a:lstStyle/>
+          <a:p>
+            <a:pPr algn="ctr"/>
+            <a:r>
+              <a:rPr lang="es-AR" sz="800" dirty="0" smtClean="0"/>
+              <a:t>Proceso de Registro de Paciente</a:t>
+            </a:r>
+          </a:p>
+        </p:txBody>
+      </p:sp>
+      <p:grpSp>
+        <p:nvGrpSpPr>
+          <p:cNvPr id="147" name="Grupo 146"/>
+          <p:cNvGrpSpPr/>
+          <p:nvPr/>
+        </p:nvGrpSpPr>
+        <p:grpSpPr>
+          <a:xfrm>
+            <a:off x="2720752" y="2690698"/>
+            <a:ext cx="606147" cy="261598"/>
+            <a:chOff x="-580282" y="2385898"/>
+            <a:chExt cx="606147" cy="261598"/>
+          </a:xfrm>
+        </p:grpSpPr>
+        <p:cxnSp>
+          <p:nvCxnSpPr>
+            <p:cNvPr id="148" name="27 Conector angular"/>
+            <p:cNvCxnSpPr>
+              <a:stCxn id="77" idx="3"/>
+              <a:endCxn id="145" idx="1"/>
+            </p:cNvCxnSpPr>
+            <p:nvPr/>
+          </p:nvCxnSpPr>
+          <p:spPr>
+            <a:xfrm flipV="1">
+              <a:off x="-580282" y="2630392"/>
+              <a:ext cx="606147" cy="6888"/>
+            </a:xfrm>
+            <a:prstGeom prst="bentConnector3">
+              <a:avLst>
+                <a:gd name="adj1" fmla="val 50000"/>
+              </a:avLst>
+            </a:prstGeom>
+            <a:ln>
+              <a:tailEnd type="arrow"/>
+            </a:ln>
+          </p:spPr>
+          <p:style>
+            <a:lnRef idx="1">
+              <a:schemeClr val="accent1"/>
+            </a:lnRef>
+            <a:fillRef idx="0">
+              <a:schemeClr val="accent1"/>
+            </a:fillRef>
+            <a:effectRef idx="0">
+              <a:schemeClr val="accent1"/>
+            </a:effectRef>
+            <a:fontRef idx="minor">
+              <a:schemeClr val="tx1"/>
+            </a:fontRef>
+          </p:style>
+        </p:cxnSp>
+        <p:sp>
+          <p:nvSpPr>
+            <p:cNvPr id="149" name="20 CuadroTexto"/>
+            <p:cNvSpPr txBox="1"/>
+            <p:nvPr/>
+          </p:nvSpPr>
+          <p:spPr>
+            <a:xfrm>
+              <a:off x="-486460" y="2385898"/>
+              <a:ext cx="366242" cy="261598"/>
+            </a:xfrm>
+            <a:prstGeom prst="rect">
+              <a:avLst/>
+            </a:prstGeom>
+            <a:noFill/>
+          </p:spPr>
+          <p:txBody>
+            <a:bodyPr wrap="square" lIns="91429" tIns="45714" rIns="91429" bIns="45714" rtlCol="0">
+              <a:spAutoFit/>
+            </a:bodyPr>
+            <a:lstStyle/>
+            <a:p>
+              <a:r>
+                <a:rPr lang="es-AR" sz="1100" dirty="0" smtClean="0"/>
+                <a:t>NO</a:t>
+              </a:r>
+              <a:endParaRPr lang="es-AR" dirty="0"/>
+            </a:p>
+          </p:txBody>
+        </p:sp>
+      </p:grpSp>
+      <p:sp>
+        <p:nvSpPr>
+          <p:cNvPr id="158" name="5 Decisión"/>
+          <p:cNvSpPr/>
+          <p:nvPr/>
+        </p:nvSpPr>
+        <p:spPr>
+          <a:xfrm>
+            <a:off x="4687488" y="4643674"/>
+            <a:ext cx="1436375" cy="588590"/>
+          </a:xfrm>
+          <a:prstGeom prst="flowChartDecision">
+            <a:avLst/>
+          </a:prstGeom>
+        </p:spPr>
+        <p:style>
+          <a:lnRef idx="2">
+            <a:schemeClr val="accent1">
+              <a:shade val="50000"/>
+            </a:schemeClr>
+          </a:lnRef>
+          <a:fillRef idx="1">
+            <a:schemeClr val="accent1"/>
+          </a:fillRef>
+          <a:effectRef idx="0">
+            <a:schemeClr val="accent1"/>
+          </a:effectRef>
+          <a:fontRef idx="minor">
+            <a:schemeClr val="lt1"/>
+          </a:fontRef>
+        </p:style>
+        <p:txBody>
+          <a:bodyPr lIns="91429" tIns="45714" rIns="91429" bIns="45714" rtlCol="0" anchor="ctr"/>
+          <a:lstStyle/>
+          <a:p>
+            <a:pPr algn="ctr"/>
+            <a:r>
+              <a:rPr lang="es-AR" sz="800" dirty="0" smtClean="0"/>
+              <a:t>¿Se registró y se asigno?</a:t>
+            </a:r>
+            <a:endParaRPr lang="es-AR" sz="800" dirty="0"/>
+          </a:p>
+        </p:txBody>
+      </p:sp>
+      <p:cxnSp>
+        <p:nvCxnSpPr>
+          <p:cNvPr id="159" name="27 Conector angular"/>
+          <p:cNvCxnSpPr>
+            <a:stCxn id="145" idx="3"/>
+            <a:endCxn id="158" idx="0"/>
+          </p:cNvCxnSpPr>
+          <p:nvPr/>
+        </p:nvCxnSpPr>
+        <p:spPr>
+          <a:xfrm>
+            <a:off x="4208921" y="2935192"/>
+            <a:ext cx="1196755" cy="1708482"/>
+          </a:xfrm>
+          <a:prstGeom prst="bentConnector2">
+            <a:avLst/>
+          </a:prstGeom>
+          <a:ln>
+            <a:tailEnd type="arrow"/>
+          </a:ln>
+        </p:spPr>
+        <p:style>
+          <a:lnRef idx="1">
+            <a:schemeClr val="accent1"/>
+          </a:lnRef>
+          <a:fillRef idx="0">
+            <a:schemeClr val="accent1"/>
+          </a:fillRef>
+          <a:effectRef idx="0">
+            <a:schemeClr val="accent1"/>
+          </a:effectRef>
+          <a:fontRef idx="minor">
+            <a:schemeClr val="tx1"/>
+          </a:fontRef>
+        </p:style>
+      </p:cxnSp>
+      <p:grpSp>
+        <p:nvGrpSpPr>
+          <p:cNvPr id="165" name="Grupo 164"/>
+          <p:cNvGrpSpPr/>
+          <p:nvPr/>
+        </p:nvGrpSpPr>
+        <p:grpSpPr>
+          <a:xfrm>
+            <a:off x="3296816" y="1276674"/>
+            <a:ext cx="3119016" cy="3665910"/>
+            <a:chOff x="-4218" y="-1469101"/>
+            <a:chExt cx="3119016" cy="3665910"/>
+          </a:xfrm>
+        </p:grpSpPr>
+        <p:cxnSp>
+          <p:nvCxnSpPr>
+            <p:cNvPr id="166" name="27 Conector angular"/>
+            <p:cNvCxnSpPr>
+              <a:stCxn id="158" idx="3"/>
+              <a:endCxn id="67" idx="3"/>
+            </p:cNvCxnSpPr>
+            <p:nvPr/>
+          </p:nvCxnSpPr>
+          <p:spPr>
+            <a:xfrm flipH="1" flipV="1">
+              <a:off x="-4218" y="-1469101"/>
+              <a:ext cx="2827047" cy="3661295"/>
+            </a:xfrm>
+            <a:prstGeom prst="bentConnector3">
+              <a:avLst>
+                <a:gd name="adj1" fmla="val -8086"/>
+              </a:avLst>
+            </a:prstGeom>
+            <a:ln>
+              <a:tailEnd type="arrow"/>
+            </a:ln>
+          </p:spPr>
+          <p:style>
+            <a:lnRef idx="1">
+              <a:schemeClr val="accent1"/>
+            </a:lnRef>
+            <a:fillRef idx="0">
+              <a:schemeClr val="accent1"/>
+            </a:fillRef>
+            <a:effectRef idx="0">
+              <a:schemeClr val="accent1"/>
+            </a:effectRef>
+            <a:fontRef idx="minor">
+              <a:schemeClr val="tx1"/>
+            </a:fontRef>
+          </p:style>
+        </p:cxnSp>
+        <p:sp>
+          <p:nvSpPr>
+            <p:cNvPr id="167" name="20 CuadroTexto"/>
+            <p:cNvSpPr txBox="1"/>
+            <p:nvPr/>
+          </p:nvSpPr>
+          <p:spPr>
+            <a:xfrm>
+              <a:off x="2748556" y="1935211"/>
+              <a:ext cx="366242" cy="261598"/>
+            </a:xfrm>
+            <a:prstGeom prst="rect">
+              <a:avLst/>
+            </a:prstGeom>
+            <a:noFill/>
+          </p:spPr>
+          <p:txBody>
+            <a:bodyPr wrap="square" lIns="91429" tIns="45714" rIns="91429" bIns="45714" rtlCol="0">
+              <a:spAutoFit/>
+            </a:bodyPr>
+            <a:lstStyle/>
+            <a:p>
+              <a:r>
+                <a:rPr lang="es-AR" sz="1100" dirty="0" smtClean="0"/>
+                <a:t>NO</a:t>
+              </a:r>
+              <a:endParaRPr lang="es-AR" dirty="0"/>
+            </a:p>
+          </p:txBody>
+        </p:sp>
+      </p:grpSp>
+      <p:grpSp>
+        <p:nvGrpSpPr>
+          <p:cNvPr id="169" name="Grupo 168"/>
+          <p:cNvGrpSpPr/>
+          <p:nvPr/>
+        </p:nvGrpSpPr>
+        <p:grpSpPr>
+          <a:xfrm>
+            <a:off x="1300310" y="4720329"/>
+            <a:ext cx="3478500" cy="261598"/>
+            <a:chOff x="-859930" y="3453777"/>
+            <a:chExt cx="3478500" cy="261598"/>
+          </a:xfrm>
+        </p:grpSpPr>
+        <p:cxnSp>
+          <p:nvCxnSpPr>
+            <p:cNvPr id="170" name="27 Conector angular"/>
+            <p:cNvCxnSpPr>
+              <a:stCxn id="158" idx="1"/>
+              <a:endCxn id="111" idx="3"/>
+            </p:cNvCxnSpPr>
+            <p:nvPr/>
+          </p:nvCxnSpPr>
+          <p:spPr>
+            <a:xfrm rot="10800000">
+              <a:off x="-859930" y="3554679"/>
+              <a:ext cx="3387179" cy="116738"/>
+            </a:xfrm>
+            <a:prstGeom prst="bentConnector3">
+              <a:avLst>
+                <a:gd name="adj1" fmla="val 50000"/>
+              </a:avLst>
+            </a:prstGeom>
+            <a:ln>
+              <a:tailEnd type="arrow"/>
+            </a:ln>
+          </p:spPr>
+          <p:style>
+            <a:lnRef idx="1">
+              <a:schemeClr val="accent1"/>
+            </a:lnRef>
+            <a:fillRef idx="0">
+              <a:schemeClr val="accent1"/>
+            </a:fillRef>
+            <a:effectRef idx="0">
+              <a:schemeClr val="accent1"/>
+            </a:effectRef>
+            <a:fontRef idx="minor">
+              <a:schemeClr val="tx1"/>
+            </a:fontRef>
+          </p:style>
+        </p:cxnSp>
+        <p:sp>
+          <p:nvSpPr>
+            <p:cNvPr id="171" name="20 CuadroTexto"/>
+            <p:cNvSpPr txBox="1"/>
+            <p:nvPr/>
+          </p:nvSpPr>
+          <p:spPr>
+            <a:xfrm>
+              <a:off x="2261380" y="3453777"/>
+              <a:ext cx="357190" cy="261598"/>
+            </a:xfrm>
+            <a:prstGeom prst="rect">
+              <a:avLst/>
+            </a:prstGeom>
+            <a:noFill/>
+          </p:spPr>
+          <p:txBody>
+            <a:bodyPr wrap="square" lIns="91429" tIns="45714" rIns="91429" bIns="45714" rtlCol="0">
+              <a:spAutoFit/>
+            </a:bodyPr>
+            <a:lstStyle/>
+            <a:p>
+              <a:r>
+                <a:rPr lang="es-AR" sz="1100" dirty="0" smtClean="0"/>
+                <a:t>SI</a:t>
+              </a:r>
+              <a:endParaRPr lang="es-AR" dirty="0"/>
+            </a:p>
+          </p:txBody>
+        </p:sp>
+      </p:grpSp>
+      <p:sp>
+        <p:nvSpPr>
+          <p:cNvPr id="187" name="3 Proceso"/>
+          <p:cNvSpPr/>
+          <p:nvPr/>
+        </p:nvSpPr>
+        <p:spPr>
+          <a:xfrm>
+            <a:off x="2054754" y="3798664"/>
+            <a:ext cx="882022" cy="428628"/>
+          </a:xfrm>
+          <a:prstGeom prst="flowChartProcess">
+            <a:avLst/>
+          </a:prstGeom>
+        </p:spPr>
+        <p:style>
+          <a:lnRef idx="2">
+            <a:schemeClr val="accent5">
+              <a:shade val="50000"/>
+            </a:schemeClr>
+          </a:lnRef>
+          <a:fillRef idx="1">
+            <a:schemeClr val="accent5"/>
+          </a:fillRef>
+          <a:effectRef idx="0">
+            <a:schemeClr val="accent5"/>
+          </a:effectRef>
+          <a:fontRef idx="minor">
+            <a:schemeClr val="lt1"/>
+          </a:fontRef>
+        </p:style>
+        <p:txBody>
+          <a:bodyPr lIns="91423" tIns="45711" rIns="91423" bIns="45711" rtlCol="0" anchor="ctr"/>
+          <a:lstStyle/>
+          <a:p>
+            <a:pPr algn="ctr"/>
+            <a:r>
+              <a:rPr lang="es-AR" sz="800" dirty="0" smtClean="0"/>
+              <a:t>Asignación de Paciente</a:t>
+            </a:r>
+          </a:p>
+        </p:txBody>
+      </p:sp>
+      <p:cxnSp>
+        <p:nvCxnSpPr>
+          <p:cNvPr id="189" name="27 Conector angular"/>
+          <p:cNvCxnSpPr>
+            <a:stCxn id="112" idx="3"/>
+            <a:endCxn id="187" idx="0"/>
+          </p:cNvCxnSpPr>
+          <p:nvPr/>
+        </p:nvCxnSpPr>
+        <p:spPr>
+          <a:xfrm>
+            <a:off x="1664589" y="3549511"/>
+            <a:ext cx="831176" cy="249153"/>
+          </a:xfrm>
+          <a:prstGeom prst="bentConnector2">
+            <a:avLst/>
+          </a:prstGeom>
+          <a:ln>
+            <a:tailEnd type="arrow"/>
+          </a:ln>
+        </p:spPr>
+        <p:style>
+          <a:lnRef idx="1">
+            <a:schemeClr val="accent1"/>
+          </a:lnRef>
+          <a:fillRef idx="0">
+            <a:schemeClr val="accent1"/>
+          </a:fillRef>
+          <a:effectRef idx="0">
+            <a:schemeClr val="accent1"/>
+          </a:effectRef>
+          <a:fontRef idx="minor">
+            <a:schemeClr val="tx1"/>
+          </a:fontRef>
+        </p:style>
+      </p:cxnSp>
+      <p:cxnSp>
+        <p:nvCxnSpPr>
+          <p:cNvPr id="191" name="27 Conector angular"/>
+          <p:cNvCxnSpPr>
+            <a:stCxn id="187" idx="2"/>
+            <a:endCxn id="111" idx="0"/>
+          </p:cNvCxnSpPr>
+          <p:nvPr/>
+        </p:nvCxnSpPr>
+        <p:spPr>
+          <a:xfrm rot="5400000">
+            <a:off x="1487720" y="3598871"/>
+            <a:ext cx="379625" cy="1636467"/>
+          </a:xfrm>
+          <a:prstGeom prst="bentConnector3">
+            <a:avLst>
+              <a:gd name="adj1" fmla="val 50000"/>
+            </a:avLst>
+          </a:prstGeom>
+          <a:ln>
+            <a:tailEnd type="arrow"/>
+          </a:ln>
+        </p:spPr>
+        <p:style>
+          <a:lnRef idx="1">
+            <a:schemeClr val="accent1"/>
+          </a:lnRef>
+          <a:fillRef idx="0">
+            <a:schemeClr val="accent1"/>
+          </a:fillRef>
+          <a:effectRef idx="0">
+            <a:schemeClr val="accent1"/>
+          </a:effectRef>
+          <a:fontRef idx="minor">
+            <a:schemeClr val="tx1"/>
+          </a:fontRef>
+        </p:style>
+      </p:cxnSp>
+      <p:grpSp>
+        <p:nvGrpSpPr>
+          <p:cNvPr id="214" name="Grupo 213"/>
+          <p:cNvGrpSpPr/>
+          <p:nvPr/>
+        </p:nvGrpSpPr>
+        <p:grpSpPr>
+          <a:xfrm>
+            <a:off x="2936777" y="3116760"/>
+            <a:ext cx="4357258" cy="896217"/>
+            <a:chOff x="-1778756" y="1666491"/>
+            <a:chExt cx="4357258" cy="896217"/>
+          </a:xfrm>
+        </p:grpSpPr>
+        <p:cxnSp>
+          <p:nvCxnSpPr>
+            <p:cNvPr id="215" name="27 Conector angular"/>
+            <p:cNvCxnSpPr>
+              <a:stCxn id="76" idx="2"/>
+              <a:endCxn id="187" idx="3"/>
+            </p:cNvCxnSpPr>
+            <p:nvPr/>
+          </p:nvCxnSpPr>
+          <p:spPr>
+            <a:xfrm rot="5400000">
+              <a:off x="-73313" y="-38952"/>
+              <a:ext cx="896217" cy="4307104"/>
+            </a:xfrm>
+            <a:prstGeom prst="bentConnector2">
+              <a:avLst/>
+            </a:prstGeom>
+            <a:ln>
+              <a:tailEnd type="arrow"/>
+            </a:ln>
+          </p:spPr>
+          <p:style>
+            <a:lnRef idx="1">
+              <a:schemeClr val="accent1"/>
+            </a:lnRef>
+            <a:fillRef idx="0">
+              <a:schemeClr val="accent1"/>
+            </a:fillRef>
+            <a:effectRef idx="0">
+              <a:schemeClr val="accent1"/>
+            </a:effectRef>
+            <a:fontRef idx="minor">
+              <a:schemeClr val="tx1"/>
+            </a:fontRef>
+          </p:style>
+        </p:cxnSp>
+        <p:sp>
+          <p:nvSpPr>
+            <p:cNvPr id="216" name="20 CuadroTexto"/>
+            <p:cNvSpPr txBox="1"/>
+            <p:nvPr/>
+          </p:nvSpPr>
+          <p:spPr>
+            <a:xfrm>
+              <a:off x="2273602" y="1767775"/>
+              <a:ext cx="304900" cy="261598"/>
+            </a:xfrm>
+            <a:prstGeom prst="rect">
+              <a:avLst/>
+            </a:prstGeom>
+            <a:noFill/>
+          </p:spPr>
+          <p:txBody>
+            <a:bodyPr wrap="square" lIns="91429" tIns="45714" rIns="91429" bIns="45714" rtlCol="0">
+              <a:spAutoFit/>
+            </a:bodyPr>
+            <a:lstStyle/>
+            <a:p>
+              <a:r>
+                <a:rPr lang="es-AR" sz="1100" dirty="0" smtClean="0"/>
+                <a:t>SI</a:t>
+              </a:r>
+              <a:endParaRPr lang="es-AR" dirty="0"/>
+            </a:p>
+          </p:txBody>
+        </p:sp>
+      </p:grpSp>
+      <p:grpSp>
+        <p:nvGrpSpPr>
+          <p:cNvPr id="230" name="Grupo 229"/>
+          <p:cNvGrpSpPr/>
+          <p:nvPr/>
+        </p:nvGrpSpPr>
+        <p:grpSpPr>
+          <a:xfrm>
+            <a:off x="201684" y="1276675"/>
+            <a:ext cx="2213109" cy="4377452"/>
+            <a:chOff x="1544012" y="-2297636"/>
+            <a:chExt cx="2213109" cy="4377452"/>
+          </a:xfrm>
+        </p:grpSpPr>
+        <p:cxnSp>
+          <p:nvCxnSpPr>
+            <p:cNvPr id="231" name="27 Conector angular"/>
+            <p:cNvCxnSpPr>
+              <a:stCxn id="122" idx="1"/>
+              <a:endCxn id="67" idx="1"/>
+            </p:cNvCxnSpPr>
+            <p:nvPr/>
+          </p:nvCxnSpPr>
+          <p:spPr>
+            <a:xfrm rot="10800000" flipH="1">
+              <a:off x="1915546" y="-2297636"/>
+              <a:ext cx="1841575" cy="4312905"/>
+            </a:xfrm>
+            <a:prstGeom prst="bentConnector3">
+              <a:avLst>
+                <a:gd name="adj1" fmla="val -24665"/>
+              </a:avLst>
+            </a:prstGeom>
+            <a:ln>
+              <a:tailEnd type="arrow"/>
+            </a:ln>
+          </p:spPr>
+          <p:style>
+            <a:lnRef idx="1">
+              <a:schemeClr val="accent1"/>
+            </a:lnRef>
+            <a:fillRef idx="0">
+              <a:schemeClr val="accent1"/>
+            </a:fillRef>
+            <a:effectRef idx="0">
+              <a:schemeClr val="accent1"/>
+            </a:effectRef>
+            <a:fontRef idx="minor">
+              <a:schemeClr val="tx1"/>
+            </a:fontRef>
+          </p:style>
+        </p:cxnSp>
+        <p:sp>
+          <p:nvSpPr>
+            <p:cNvPr id="232" name="20 CuadroTexto"/>
+            <p:cNvSpPr txBox="1"/>
+            <p:nvPr/>
+          </p:nvSpPr>
+          <p:spPr>
+            <a:xfrm>
+              <a:off x="1544012" y="1818218"/>
+              <a:ext cx="366242" cy="261598"/>
+            </a:xfrm>
+            <a:prstGeom prst="rect">
+              <a:avLst/>
+            </a:prstGeom>
+            <a:noFill/>
+          </p:spPr>
+          <p:txBody>
+            <a:bodyPr wrap="square" lIns="91429" tIns="45714" rIns="91429" bIns="45714" rtlCol="0">
+              <a:spAutoFit/>
+            </a:bodyPr>
+            <a:lstStyle/>
+            <a:p>
+              <a:r>
+                <a:rPr lang="es-AR" sz="1100" dirty="0" smtClean="0"/>
+                <a:t>NO</a:t>
+              </a:r>
+              <a:endParaRPr lang="es-AR" dirty="0"/>
+            </a:p>
+          </p:txBody>
+        </p:sp>
+      </p:grpSp>
+    </p:spTree>
+    <p:extLst>
+      <p:ext uri="{BB962C8B-B14F-4D97-AF65-F5344CB8AC3E}">
+        <p14:creationId xmlns:p14="http://schemas.microsoft.com/office/powerpoint/2010/main" val="1085024855"/>
+      </p:ext>
+    </p:extLst>
+  </p:cSld>
+  <p:clrMapOvr>
+    <a:masterClrMapping/>
+  </p:clrMapOvr>
+  <p:timing>
+    <p:tnLst>
+      <p:par>
+        <p:cTn id="1" dur="indefinite" restart="never" nodeType="tmRoot"/>
+      </p:par>
+    </p:tnLst>
+  </p:timing>
+</p:sld>
+</file>
+
+<file path=ppt/slides/slide3.xml><?xml version="1.0" encoding="utf-8"?>
+<p:sld xmlns:a="http://schemas.openxmlformats.org/drawingml/2006/main" xmlns:r="http://schemas.openxmlformats.org/officeDocument/2006/relationships" xmlns:p="http://schemas.openxmlformats.org/presentationml/2006/main">
+  <p:cSld>
+    <p:bg>
+      <p:bgPr>
+        <a:solidFill>
+          <a:schemeClr val="accent3">
+            <a:lumMod val="20000"/>
+            <a:lumOff val="80000"/>
+          </a:schemeClr>
+        </a:solidFill>
+        <a:effectLst/>
+      </p:bgPr>
+    </p:bg>
+    <p:spTree>
+      <p:nvGrpSpPr>
+        <p:cNvPr id="1" name=""/>
+        <p:cNvGrpSpPr/>
+        <p:nvPr/>
+      </p:nvGrpSpPr>
+      <p:grpSpPr>
+        <a:xfrm>
+          <a:off x="0" y="0"/>
+          <a:ext cx="0" cy="0"/>
+          <a:chOff x="0" y="0"/>
+          <a:chExt cx="0" cy="0"/>
+        </a:xfrm>
+      </p:grpSpPr>
+      <p:sp>
+        <p:nvSpPr>
           <p:cNvPr id="4" name="3 Proceso"/>
           <p:cNvSpPr/>
           <p:nvPr/>
@@ -6845,13 +8878,8 @@
             <a:pPr algn="ctr"/>
             <a:r>
               <a:rPr lang="es-AR" sz="800" dirty="0" smtClean="0"/>
-              <a:t>Asignar Paciente al </a:t>
-            </a:r>
-            <a:r>
-              <a:rPr lang="es-AR" sz="800" dirty="0" smtClean="0"/>
-              <a:t>Alumno y lo Confirma</a:t>
-            </a:r>
-            <a:endParaRPr lang="es-AR" sz="800" dirty="0" smtClean="0"/>
+              <a:t>Asignar Paciente al Alumno y lo Confirma</a:t>
+            </a:r>
           </a:p>
           <a:p>
             <a:pPr algn="ctr"/>
@@ -7297,15 +9325,7 @@
             <a:pPr algn="ctr"/>
             <a:r>
               <a:rPr lang="es-AR" sz="800" dirty="0" smtClean="0"/>
-              <a:t>Alumno </a:t>
-            </a:r>
-            <a:r>
-              <a:rPr lang="es-AR" sz="800" dirty="0" smtClean="0"/>
-              <a:t>Asigna </a:t>
-            </a:r>
-            <a:r>
-              <a:rPr lang="es-AR" sz="800" dirty="0" smtClean="0"/>
-              <a:t>Paciente</a:t>
+              <a:t>Alumno Asigna Paciente</a:t>
             </a:r>
           </a:p>
           <a:p>
@@ -7942,19 +9962,7 @@
             <a:pPr algn="ctr"/>
             <a:r>
               <a:rPr lang="es-AR" sz="800" dirty="0" smtClean="0"/>
-              <a:t>El RRP </a:t>
-            </a:r>
-            <a:r>
-              <a:rPr lang="es-AR" sz="800" dirty="0" smtClean="0"/>
-              <a:t>Busca al Alumno</a:t>
-            </a:r>
-            <a:r>
-              <a:rPr lang="es-AR" sz="800" dirty="0" smtClean="0"/>
-              <a:t> </a:t>
-            </a:r>
-            <a:r>
-              <a:rPr lang="es-AR" sz="800" dirty="0" smtClean="0"/>
-              <a:t>en el Sistema</a:t>
+              <a:t>El RRP Busca al Alumno en el Sistema</a:t>
             </a:r>
           </a:p>
         </p:txBody>
@@ -7999,7 +10007,6 @@
               <a:rPr lang="es-AR" sz="800" dirty="0" smtClean="0"/>
               <a:t>El RRP Busca Paciente en el Sistema y lo Asigna al Alumno</a:t>
             </a:r>
-            <a:endParaRPr lang="es-AR" sz="800" dirty="0" smtClean="0"/>
           </a:p>
           <a:p>
             <a:pPr algn="ctr"/>

</xml_diff>

<commit_message>
se modifico la PPT_Flujograma - Proceso Mejorado.pptx
</commit_message>
<xml_diff>
--- a/repository/S.A.P.O/Producto/Iteraciones/Iteracion_02/01_Documento_Negocio/PPT_Flujograma - Proceso Mejorado/PPT_Flujograma - Proceso Mejorado.pptx
+++ b/repository/S.A.P.O/Producto/Iteraciones/Iteracion_02/01_Documento_Negocio/PPT_Flujograma - Proceso Mejorado/PPT_Flujograma - Proceso Mejorado.pptx
@@ -5,12 +5,13 @@
     <p:sldMasterId id="2147483648" r:id="rId1"/>
   </p:sldMasterIdLst>
   <p:notesMasterIdLst>
-    <p:notesMasterId r:id="rId5"/>
+    <p:notesMasterId r:id="rId6"/>
   </p:notesMasterIdLst>
   <p:sldIdLst>
     <p:sldId id="256" r:id="rId2"/>
     <p:sldId id="258" r:id="rId3"/>
     <p:sldId id="257" r:id="rId4"/>
+    <p:sldId id="259" r:id="rId5"/>
   </p:sldIdLst>
   <p:sldSz cx="9906000" cy="7453313"/>
   <p:notesSz cx="6858000" cy="9144000"/>
@@ -111,7 +112,7 @@
   </p:defaultTextStyle>
   <p:extLst>
     <p:ext uri="{EFAFB233-063F-42B5-8137-9DF3F51BA10A}">
-      <p15:sldGuideLst xmlns:p15="http://schemas.microsoft.com/office/powerpoint/2012/main">
+      <p15:sldGuideLst xmlns:p15="http://schemas.microsoft.com/office/powerpoint/2012/main" xmlns="">
         <p15:guide id="1" orient="horz" pos="2348">
           <p15:clr>
             <a:srgbClr val="A4A3A4"/>
@@ -210,7 +211,8 @@
           <a:p>
             <a:fld id="{F8689C98-693D-4114-AC58-422815A38E22}" type="datetimeFigureOut">
               <a:rPr lang="es-AR" smtClean="0"/>
-              <a:t>26/08/2013</a:t>
+              <a:pPr/>
+              <a:t>27/08/2013</a:t>
             </a:fld>
             <a:endParaRPr lang="es-AR"/>
           </a:p>
@@ -369,6 +371,7 @@
           <a:p>
             <a:fld id="{C0BB5515-7B79-4815-B0D7-FE80C9729B87}" type="slidenum">
               <a:rPr lang="es-AR" smtClean="0"/>
+              <a:pPr/>
               <a:t>‹Nº›</a:t>
             </a:fld>
             <a:endParaRPr lang="es-AR"/>
@@ -378,7 +381,7 @@
     </p:spTree>
     <p:extLst>
       <p:ext uri="{BB962C8B-B14F-4D97-AF65-F5344CB8AC3E}">
-        <p14:creationId xmlns:p14="http://schemas.microsoft.com/office/powerpoint/2010/main" val="2736709763"/>
+        <p14:creationId xmlns:p14="http://schemas.microsoft.com/office/powerpoint/2010/main" xmlns="" val="2736709763"/>
       </p:ext>
     </p:extLst>
   </p:cSld>
@@ -543,6 +546,7 @@
           <a:p>
             <a:fld id="{C0BB5515-7B79-4815-B0D7-FE80C9729B87}" type="slidenum">
               <a:rPr lang="es-AR" smtClean="0"/>
+              <a:pPr/>
               <a:t>1</a:t>
             </a:fld>
             <a:endParaRPr lang="es-AR"/>
@@ -552,7 +556,7 @@
     </p:spTree>
     <p:extLst>
       <p:ext uri="{BB962C8B-B14F-4D97-AF65-F5344CB8AC3E}">
-        <p14:creationId xmlns:p14="http://schemas.microsoft.com/office/powerpoint/2010/main" val="2457698222"/>
+        <p14:creationId xmlns:p14="http://schemas.microsoft.com/office/powerpoint/2010/main" xmlns="" val="2457698222"/>
       </p:ext>
     </p:extLst>
   </p:cSld>
@@ -744,7 +748,7 @@
             <a:fld id="{F2836247-D755-492A-BA3E-93510ACEE91B}" type="datetimeFigureOut">
               <a:rPr lang="es-AR" smtClean="0"/>
               <a:pPr/>
-              <a:t>26/08/2013</a:t>
+              <a:t>27/08/2013</a:t>
             </a:fld>
             <a:endParaRPr lang="es-AR" dirty="0"/>
           </a:p>
@@ -796,7 +800,7 @@
     </p:spTree>
     <p:extLst>
       <p:ext uri="{BB962C8B-B14F-4D97-AF65-F5344CB8AC3E}">
-        <p14:creationId xmlns:p14="http://schemas.microsoft.com/office/powerpoint/2010/main" val="4087890455"/>
+        <p14:creationId xmlns:p14="http://schemas.microsoft.com/office/powerpoint/2010/main" xmlns="" val="4087890455"/>
       </p:ext>
     </p:extLst>
   </p:cSld>
@@ -916,7 +920,7 @@
             <a:fld id="{F2836247-D755-492A-BA3E-93510ACEE91B}" type="datetimeFigureOut">
               <a:rPr lang="es-AR" smtClean="0"/>
               <a:pPr/>
-              <a:t>26/08/2013</a:t>
+              <a:t>27/08/2013</a:t>
             </a:fld>
             <a:endParaRPr lang="es-AR" dirty="0"/>
           </a:p>
@@ -968,7 +972,7 @@
     </p:spTree>
     <p:extLst>
       <p:ext uri="{BB962C8B-B14F-4D97-AF65-F5344CB8AC3E}">
-        <p14:creationId xmlns:p14="http://schemas.microsoft.com/office/powerpoint/2010/main" val="2061004516"/>
+        <p14:creationId xmlns:p14="http://schemas.microsoft.com/office/powerpoint/2010/main" xmlns="" val="2061004516"/>
       </p:ext>
     </p:extLst>
   </p:cSld>
@@ -1098,7 +1102,7 @@
             <a:fld id="{F2836247-D755-492A-BA3E-93510ACEE91B}" type="datetimeFigureOut">
               <a:rPr lang="es-AR" smtClean="0"/>
               <a:pPr/>
-              <a:t>26/08/2013</a:t>
+              <a:t>27/08/2013</a:t>
             </a:fld>
             <a:endParaRPr lang="es-AR" dirty="0"/>
           </a:p>
@@ -1150,7 +1154,7 @@
     </p:spTree>
     <p:extLst>
       <p:ext uri="{BB962C8B-B14F-4D97-AF65-F5344CB8AC3E}">
-        <p14:creationId xmlns:p14="http://schemas.microsoft.com/office/powerpoint/2010/main" val="979922742"/>
+        <p14:creationId xmlns:p14="http://schemas.microsoft.com/office/powerpoint/2010/main" xmlns="" val="979922742"/>
       </p:ext>
     </p:extLst>
   </p:cSld>
@@ -1270,7 +1274,7 @@
             <a:fld id="{F2836247-D755-492A-BA3E-93510ACEE91B}" type="datetimeFigureOut">
               <a:rPr lang="es-AR" smtClean="0"/>
               <a:pPr/>
-              <a:t>26/08/2013</a:t>
+              <a:t>27/08/2013</a:t>
             </a:fld>
             <a:endParaRPr lang="es-AR" dirty="0"/>
           </a:p>
@@ -1322,7 +1326,7 @@
     </p:spTree>
     <p:extLst>
       <p:ext uri="{BB962C8B-B14F-4D97-AF65-F5344CB8AC3E}">
-        <p14:creationId xmlns:p14="http://schemas.microsoft.com/office/powerpoint/2010/main" val="172037397"/>
+        <p14:creationId xmlns:p14="http://schemas.microsoft.com/office/powerpoint/2010/main" xmlns="" val="172037397"/>
       </p:ext>
     </p:extLst>
   </p:cSld>
@@ -1518,7 +1522,7 @@
             <a:fld id="{F2836247-D755-492A-BA3E-93510ACEE91B}" type="datetimeFigureOut">
               <a:rPr lang="es-AR" smtClean="0"/>
               <a:pPr/>
-              <a:t>26/08/2013</a:t>
+              <a:t>27/08/2013</a:t>
             </a:fld>
             <a:endParaRPr lang="es-AR" dirty="0"/>
           </a:p>
@@ -1570,7 +1574,7 @@
     </p:spTree>
     <p:extLst>
       <p:ext uri="{BB962C8B-B14F-4D97-AF65-F5344CB8AC3E}">
-        <p14:creationId xmlns:p14="http://schemas.microsoft.com/office/powerpoint/2010/main" val="3298102658"/>
+        <p14:creationId xmlns:p14="http://schemas.microsoft.com/office/powerpoint/2010/main" xmlns="" val="3298102658"/>
       </p:ext>
     </p:extLst>
   </p:cSld>
@@ -1808,7 +1812,7 @@
             <a:fld id="{F2836247-D755-492A-BA3E-93510ACEE91B}" type="datetimeFigureOut">
               <a:rPr lang="es-AR" smtClean="0"/>
               <a:pPr/>
-              <a:t>26/08/2013</a:t>
+              <a:t>27/08/2013</a:t>
             </a:fld>
             <a:endParaRPr lang="es-AR" dirty="0"/>
           </a:p>
@@ -1860,7 +1864,7 @@
     </p:spTree>
     <p:extLst>
       <p:ext uri="{BB962C8B-B14F-4D97-AF65-F5344CB8AC3E}">
-        <p14:creationId xmlns:p14="http://schemas.microsoft.com/office/powerpoint/2010/main" val="2864823516"/>
+        <p14:creationId xmlns:p14="http://schemas.microsoft.com/office/powerpoint/2010/main" xmlns="" val="2864823516"/>
       </p:ext>
     </p:extLst>
   </p:cSld>
@@ -2232,7 +2236,7 @@
             <a:fld id="{F2836247-D755-492A-BA3E-93510ACEE91B}" type="datetimeFigureOut">
               <a:rPr lang="es-AR" smtClean="0"/>
               <a:pPr/>
-              <a:t>26/08/2013</a:t>
+              <a:t>27/08/2013</a:t>
             </a:fld>
             <a:endParaRPr lang="es-AR" dirty="0"/>
           </a:p>
@@ -2284,7 +2288,7 @@
     </p:spTree>
     <p:extLst>
       <p:ext uri="{BB962C8B-B14F-4D97-AF65-F5344CB8AC3E}">
-        <p14:creationId xmlns:p14="http://schemas.microsoft.com/office/powerpoint/2010/main" val="735162974"/>
+        <p14:creationId xmlns:p14="http://schemas.microsoft.com/office/powerpoint/2010/main" xmlns="" val="735162974"/>
       </p:ext>
     </p:extLst>
   </p:cSld>
@@ -2352,7 +2356,7 @@
             <a:fld id="{F2836247-D755-492A-BA3E-93510ACEE91B}" type="datetimeFigureOut">
               <a:rPr lang="es-AR" smtClean="0"/>
               <a:pPr/>
-              <a:t>26/08/2013</a:t>
+              <a:t>27/08/2013</a:t>
             </a:fld>
             <a:endParaRPr lang="es-AR" dirty="0"/>
           </a:p>
@@ -2404,7 +2408,7 @@
     </p:spTree>
     <p:extLst>
       <p:ext uri="{BB962C8B-B14F-4D97-AF65-F5344CB8AC3E}">
-        <p14:creationId xmlns:p14="http://schemas.microsoft.com/office/powerpoint/2010/main" val="2865487179"/>
+        <p14:creationId xmlns:p14="http://schemas.microsoft.com/office/powerpoint/2010/main" xmlns="" val="2865487179"/>
       </p:ext>
     </p:extLst>
   </p:cSld>
@@ -2449,7 +2453,7 @@
             <a:fld id="{F2836247-D755-492A-BA3E-93510ACEE91B}" type="datetimeFigureOut">
               <a:rPr lang="es-AR" smtClean="0"/>
               <a:pPr/>
-              <a:t>26/08/2013</a:t>
+              <a:t>27/08/2013</a:t>
             </a:fld>
             <a:endParaRPr lang="es-AR" dirty="0"/>
           </a:p>
@@ -2501,7 +2505,7 @@
     </p:spTree>
     <p:extLst>
       <p:ext uri="{BB962C8B-B14F-4D97-AF65-F5344CB8AC3E}">
-        <p14:creationId xmlns:p14="http://schemas.microsoft.com/office/powerpoint/2010/main" val="1909442082"/>
+        <p14:creationId xmlns:p14="http://schemas.microsoft.com/office/powerpoint/2010/main" xmlns="" val="1909442082"/>
       </p:ext>
     </p:extLst>
   </p:cSld>
@@ -2728,7 +2732,7 @@
             <a:fld id="{F2836247-D755-492A-BA3E-93510ACEE91B}" type="datetimeFigureOut">
               <a:rPr lang="es-AR" smtClean="0"/>
               <a:pPr/>
-              <a:t>26/08/2013</a:t>
+              <a:t>27/08/2013</a:t>
             </a:fld>
             <a:endParaRPr lang="es-AR" dirty="0"/>
           </a:p>
@@ -2780,7 +2784,7 @@
     </p:spTree>
     <p:extLst>
       <p:ext uri="{BB962C8B-B14F-4D97-AF65-F5344CB8AC3E}">
-        <p14:creationId xmlns:p14="http://schemas.microsoft.com/office/powerpoint/2010/main" val="3575346930"/>
+        <p14:creationId xmlns:p14="http://schemas.microsoft.com/office/powerpoint/2010/main" xmlns="" val="3575346930"/>
       </p:ext>
     </p:extLst>
   </p:cSld>
@@ -2983,7 +2987,7 @@
             <a:fld id="{F2836247-D755-492A-BA3E-93510ACEE91B}" type="datetimeFigureOut">
               <a:rPr lang="es-AR" smtClean="0"/>
               <a:pPr/>
-              <a:t>26/08/2013</a:t>
+              <a:t>27/08/2013</a:t>
             </a:fld>
             <a:endParaRPr lang="es-AR" dirty="0"/>
           </a:p>
@@ -3035,7 +3039,7 @@
     </p:spTree>
     <p:extLst>
       <p:ext uri="{BB962C8B-B14F-4D97-AF65-F5344CB8AC3E}">
-        <p14:creationId xmlns:p14="http://schemas.microsoft.com/office/powerpoint/2010/main" val="202950242"/>
+        <p14:creationId xmlns:p14="http://schemas.microsoft.com/office/powerpoint/2010/main" xmlns="" val="202950242"/>
       </p:ext>
     </p:extLst>
   </p:cSld>
@@ -3198,7 +3202,7 @@
             <a:fld id="{F2836247-D755-492A-BA3E-93510ACEE91B}" type="datetimeFigureOut">
               <a:rPr lang="es-AR" smtClean="0"/>
               <a:pPr/>
-              <a:t>26/08/2013</a:t>
+              <a:t>27/08/2013</a:t>
             </a:fld>
             <a:endParaRPr lang="es-AR" dirty="0"/>
           </a:p>
@@ -3286,7 +3290,7 @@
     </p:spTree>
     <p:extLst>
       <p:ext uri="{BB962C8B-B14F-4D97-AF65-F5344CB8AC3E}">
-        <p14:creationId xmlns:p14="http://schemas.microsoft.com/office/powerpoint/2010/main" val="4032027935"/>
+        <p14:creationId xmlns:p14="http://schemas.microsoft.com/office/powerpoint/2010/main" xmlns="" val="4032027935"/>
       </p:ext>
     </p:extLst>
   </p:cSld>
@@ -3637,7 +3641,7 @@
         </p:nvSpPr>
         <p:spPr>
           <a:xfrm>
-            <a:off x="1595414" y="1012013"/>
+            <a:off x="4381496" y="1369202"/>
             <a:ext cx="631870" cy="245311"/>
           </a:xfrm>
           <a:prstGeom prst="flowChartProcess">
@@ -3815,50 +3819,6 @@
       </p:sp>
       <p:sp>
         <p:nvSpPr>
-          <p:cNvPr id="44" name="43 Proceso"/>
-          <p:cNvSpPr/>
-          <p:nvPr/>
-        </p:nvSpPr>
-        <p:spPr>
-          <a:xfrm>
-            <a:off x="6024570" y="1061278"/>
-            <a:ext cx="702593" cy="361122"/>
-          </a:xfrm>
-          <a:prstGeom prst="flowChartProcess">
-            <a:avLst/>
-          </a:prstGeom>
-        </p:spPr>
-        <p:style>
-          <a:lnRef idx="2">
-            <a:schemeClr val="accent1">
-              <a:shade val="50000"/>
-            </a:schemeClr>
-          </a:lnRef>
-          <a:fillRef idx="1">
-            <a:schemeClr val="accent1"/>
-          </a:fillRef>
-          <a:effectRef idx="0">
-            <a:schemeClr val="accent1"/>
-          </a:effectRef>
-          <a:fontRef idx="minor">
-            <a:schemeClr val="lt1"/>
-          </a:fontRef>
-        </p:style>
-        <p:txBody>
-          <a:bodyPr lIns="91423" tIns="45711" rIns="91423" bIns="45711" rtlCol="0" anchor="ctr"/>
-          <a:lstStyle/>
-          <a:p>
-            <a:pPr algn="ctr"/>
-            <a:r>
-              <a:rPr lang="es-AR" sz="800" dirty="0" smtClean="0"/>
-              <a:t>Centro de Estudiante</a:t>
-            </a:r>
-            <a:endParaRPr lang="es-AR" sz="800" dirty="0"/>
-          </a:p>
-        </p:txBody>
-      </p:sp>
-      <p:sp>
-        <p:nvSpPr>
           <p:cNvPr id="55" name="54 Proceso"/>
           <p:cNvSpPr/>
           <p:nvPr/>
@@ -3909,7 +3869,7 @@
         </p:nvSpPr>
         <p:spPr>
           <a:xfrm>
-            <a:off x="4673119" y="3798665"/>
+            <a:off x="4738686" y="4083846"/>
             <a:ext cx="707225" cy="504055"/>
           </a:xfrm>
           <a:prstGeom prst="flowChartProcess">
@@ -3985,56 +3945,22 @@
       </p:cxnSp>
       <p:cxnSp>
         <p:nvCxnSpPr>
-          <p:cNvPr id="93" name="92 Conector angular"/>
-          <p:cNvCxnSpPr>
-            <a:stCxn id="71" idx="3"/>
-            <a:endCxn id="44" idx="0"/>
-          </p:cNvCxnSpPr>
-          <p:nvPr/>
-        </p:nvCxnSpPr>
-        <p:spPr>
-          <a:xfrm>
-            <a:off x="5109382" y="839719"/>
-            <a:ext cx="1266485" cy="221559"/>
-          </a:xfrm>
-          <a:prstGeom prst="bentConnector2">
-            <a:avLst/>
-          </a:prstGeom>
-          <a:ln>
-            <a:tailEnd type="arrow"/>
-          </a:ln>
-        </p:spPr>
-        <p:style>
-          <a:lnRef idx="1">
-            <a:schemeClr val="accent1"/>
-          </a:lnRef>
-          <a:fillRef idx="0">
-            <a:schemeClr val="accent1"/>
-          </a:fillRef>
-          <a:effectRef idx="0">
-            <a:schemeClr val="accent1"/>
-          </a:effectRef>
-          <a:fontRef idx="minor">
-            <a:schemeClr val="tx1"/>
-          </a:fontRef>
-        </p:style>
-      </p:cxnSp>
-      <p:cxnSp>
-        <p:nvCxnSpPr>
           <p:cNvPr id="95" name="94 Conector angular"/>
           <p:cNvCxnSpPr>
-            <a:stCxn id="71" idx="1"/>
+            <a:stCxn id="71" idx="2"/>
             <a:endCxn id="40" idx="0"/>
           </p:cNvCxnSpPr>
           <p:nvPr/>
         </p:nvCxnSpPr>
         <p:spPr>
-          <a:xfrm rot="10800000" flipV="1">
-            <a:off x="1911350" y="839719"/>
-            <a:ext cx="2424991" cy="172294"/>
-          </a:xfrm>
-          <a:prstGeom prst="bentConnector2">
-            <a:avLst/>
+          <a:xfrm rot="5400000">
+            <a:off x="4537853" y="1184193"/>
+            <a:ext cx="344587" cy="25430"/>
+          </a:xfrm>
+          <a:prstGeom prst="bentConnector3">
+            <a:avLst>
+              <a:gd name="adj1" fmla="val 50000"/>
+            </a:avLst>
           </a:prstGeom>
           <a:ln>
             <a:tailEnd type="arrow"/>
@@ -4101,7 +4027,7 @@
         </p:nvSpPr>
         <p:spPr>
           <a:xfrm>
-            <a:off x="4737402" y="2297896"/>
+            <a:off x="4738686" y="2512210"/>
             <a:ext cx="628187" cy="380642"/>
           </a:xfrm>
           <a:prstGeom prst="flowChartProcess">
@@ -4145,7 +4071,7 @@
         </p:nvSpPr>
         <p:spPr>
           <a:xfrm>
-            <a:off x="1588509" y="1617822"/>
+            <a:off x="4381496" y="1869268"/>
             <a:ext cx="628187" cy="308634"/>
           </a:xfrm>
           <a:prstGeom prst="flowChartProcess">
@@ -4191,8 +4117,8 @@
         </p:nvCxnSpPr>
         <p:spPr>
           <a:xfrm rot="5400000">
-            <a:off x="1726727" y="1433200"/>
-            <a:ext cx="360498" cy="8746"/>
+            <a:off x="4569134" y="1740970"/>
+            <a:ext cx="254755" cy="1841"/>
           </a:xfrm>
           <a:prstGeom prst="bentConnector3">
             <a:avLst>
@@ -4405,8 +4331,8 @@
         </p:nvCxnSpPr>
         <p:spPr>
           <a:xfrm>
-            <a:off x="5365589" y="2488217"/>
-            <a:ext cx="1637014" cy="745987"/>
+            <a:off x="5366873" y="2702531"/>
+            <a:ext cx="1635730" cy="531673"/>
           </a:xfrm>
           <a:prstGeom prst="straightConnector1">
             <a:avLst/>
@@ -4511,7 +4437,7 @@
         </p:nvSpPr>
         <p:spPr>
           <a:xfrm>
-            <a:off x="2648744" y="2214488"/>
+            <a:off x="2666984" y="2440772"/>
             <a:ext cx="1357322" cy="531901"/>
           </a:xfrm>
           <a:prstGeom prst="flowChartDecision">
@@ -4551,18 +4477,19 @@
         <p:nvCxnSpPr>
           <p:cNvPr id="110" name="109 Conector recto de flecha"/>
           <p:cNvCxnSpPr>
-            <a:stCxn id="225" idx="2"/>
             <a:endCxn id="90" idx="1"/>
           </p:cNvCxnSpPr>
           <p:nvPr/>
         </p:nvCxnSpPr>
         <p:spPr>
-          <a:xfrm rot="16200000" flipH="1">
-            <a:off x="1998682" y="1830376"/>
-            <a:ext cx="553983" cy="746141"/>
-          </a:xfrm>
-          <a:prstGeom prst="bentConnector2">
-            <a:avLst/>
+          <a:xfrm rot="10800000" flipV="1">
+            <a:off x="2666984" y="2155019"/>
+            <a:ext cx="2046846" cy="551703"/>
+          </a:xfrm>
+          <a:prstGeom prst="bentConnector3">
+            <a:avLst>
+              <a:gd name="adj1" fmla="val 111168"/>
+            </a:avLst>
           </a:prstGeom>
           <a:ln>
             <a:tailEnd type="arrow"/>
@@ -4594,8 +4521,8 @@
         </p:nvCxnSpPr>
         <p:spPr>
           <a:xfrm rot="16200000" flipH="1">
-            <a:off x="3209037" y="2864756"/>
-            <a:ext cx="630528" cy="393793"/>
+            <a:off x="3337982" y="2980335"/>
+            <a:ext cx="408234" cy="392909"/>
           </a:xfrm>
           <a:prstGeom prst="bentConnector2">
             <a:avLst/>
@@ -4659,9 +4586,9 @@
           <p:nvPr/>
         </p:nvCxnSpPr>
         <p:spPr>
-          <a:xfrm>
-            <a:off x="4006066" y="2480439"/>
-            <a:ext cx="731336" cy="7778"/>
+          <a:xfrm flipV="1">
+            <a:off x="4024306" y="2702531"/>
+            <a:ext cx="714380" cy="4192"/>
           </a:xfrm>
           <a:prstGeom prst="bentConnector3">
             <a:avLst>
@@ -4717,44 +4644,6 @@
           </a:p>
         </p:txBody>
       </p:sp>
-      <p:cxnSp>
-        <p:nvCxnSpPr>
-          <p:cNvPr id="153" name="152 Conector recto de flecha"/>
-          <p:cNvCxnSpPr>
-            <a:stCxn id="44" idx="2"/>
-            <a:endCxn id="90" idx="0"/>
-          </p:cNvCxnSpPr>
-          <p:nvPr/>
-        </p:nvCxnSpPr>
-        <p:spPr>
-          <a:xfrm rot="5400000">
-            <a:off x="4455592" y="294213"/>
-            <a:ext cx="792088" cy="3048462"/>
-          </a:xfrm>
-          <a:prstGeom prst="bentConnector3">
-            <a:avLst>
-              <a:gd name="adj1" fmla="val 50000"/>
-            </a:avLst>
-          </a:prstGeom>
-          <a:ln>
-            <a:tailEnd type="arrow"/>
-          </a:ln>
-        </p:spPr>
-        <p:style>
-          <a:lnRef idx="1">
-            <a:schemeClr val="accent1"/>
-          </a:lnRef>
-          <a:fillRef idx="0">
-            <a:schemeClr val="accent1"/>
-          </a:fillRef>
-          <a:effectRef idx="0">
-            <a:schemeClr val="accent1"/>
-          </a:effectRef>
-          <a:fontRef idx="minor">
-            <a:schemeClr val="tx1"/>
-          </a:fontRef>
-        </p:style>
-      </p:cxnSp>
       <p:cxnSp>
         <p:nvCxnSpPr>
           <p:cNvPr id="154" name="153 Conector recto de flecha"/>
@@ -4766,8 +4655,8 @@
         </p:nvCxnSpPr>
         <p:spPr>
           <a:xfrm flipV="1">
-            <a:off x="5380344" y="3552438"/>
-            <a:ext cx="1151581" cy="498255"/>
+            <a:off x="5445911" y="3552438"/>
+            <a:ext cx="1086014" cy="783436"/>
           </a:xfrm>
           <a:prstGeom prst="straightConnector1">
             <a:avLst/>
@@ -4800,7 +4689,7 @@
         </p:nvSpPr>
         <p:spPr>
           <a:xfrm>
-            <a:off x="4312908" y="4595312"/>
+            <a:off x="4381496" y="4869664"/>
             <a:ext cx="1432180" cy="571504"/>
           </a:xfrm>
           <a:prstGeom prst="flowChartDecision">
@@ -4848,7 +4737,7 @@
         <p:spPr>
           <a:xfrm rot="10800000">
             <a:off x="2144688" y="3962246"/>
-            <a:ext cx="2168220" cy="918819"/>
+            <a:ext cx="2236808" cy="1193171"/>
           </a:xfrm>
           <a:prstGeom prst="bentConnector3">
             <a:avLst>
@@ -5127,8 +5016,8 @@
         </p:nvCxnSpPr>
         <p:spPr>
           <a:xfrm rot="16200000" flipH="1">
-            <a:off x="4881569" y="4447883"/>
-            <a:ext cx="292592" cy="2266"/>
+            <a:off x="4954061" y="4726138"/>
+            <a:ext cx="281763" cy="5287"/>
           </a:xfrm>
           <a:prstGeom prst="bentConnector3">
             <a:avLst>
@@ -5275,8 +5164,8 @@
         </p:nvCxnSpPr>
         <p:spPr>
           <a:xfrm flipV="1">
-            <a:off x="5745088" y="4875940"/>
-            <a:ext cx="1027997" cy="5124"/>
+            <a:off x="5813676" y="4875940"/>
+            <a:ext cx="959409" cy="279476"/>
           </a:xfrm>
           <a:prstGeom prst="bentConnector3">
             <a:avLst>
@@ -5431,7 +5320,7 @@
         </p:nvSpPr>
         <p:spPr>
           <a:xfrm>
-            <a:off x="3721198" y="3222600"/>
+            <a:off x="3738554" y="3226590"/>
             <a:ext cx="628187" cy="308634"/>
           </a:xfrm>
           <a:prstGeom prst="flowChartProcess">
@@ -5477,11 +5366,13 @@
         </p:nvCxnSpPr>
         <p:spPr>
           <a:xfrm>
-            <a:off x="4349385" y="3376917"/>
-            <a:ext cx="323734" cy="673776"/>
+            <a:off x="4366741" y="3380907"/>
+            <a:ext cx="371945" cy="954967"/>
           </a:xfrm>
           <a:prstGeom prst="bentConnector3">
-            <a:avLst/>
+            <a:avLst>
+              <a:gd name="adj1" fmla="val 50000"/>
+            </a:avLst>
           </a:prstGeom>
           <a:ln>
             <a:tailEnd type="triangle"/>
@@ -5502,65 +5393,23 @@
           </a:fontRef>
         </p:style>
       </p:cxnSp>
-      <p:sp>
-        <p:nvSpPr>
-          <p:cNvPr id="69" name="38 Proceso"/>
-          <p:cNvSpPr/>
-          <p:nvPr/>
-        </p:nvSpPr>
-        <p:spPr>
-          <a:xfrm>
-            <a:off x="4808984" y="3006576"/>
-            <a:ext cx="628187" cy="308634"/>
-          </a:xfrm>
-          <a:prstGeom prst="flowChartProcess">
-            <a:avLst/>
-          </a:prstGeom>
-        </p:spPr>
-        <p:style>
-          <a:lnRef idx="2">
-            <a:schemeClr val="accent3">
-              <a:shade val="50000"/>
-            </a:schemeClr>
-          </a:lnRef>
-          <a:fillRef idx="1">
-            <a:schemeClr val="accent3"/>
-          </a:fillRef>
-          <a:effectRef idx="0">
-            <a:schemeClr val="accent3"/>
-          </a:effectRef>
-          <a:fontRef idx="minor">
-            <a:schemeClr val="lt1"/>
-          </a:fontRef>
-        </p:style>
-        <p:txBody>
-          <a:bodyPr lIns="91423" tIns="45711" rIns="91423" bIns="45711" rtlCol="0" anchor="ctr"/>
-          <a:lstStyle/>
-          <a:p>
-            <a:pPr algn="ctr"/>
-            <a:r>
-              <a:rPr lang="es-AR" sz="800" dirty="0" smtClean="0"/>
-              <a:t>Análisis  Preliminar</a:t>
-            </a:r>
-          </a:p>
-        </p:txBody>
-      </p:sp>
       <p:cxnSp>
         <p:nvCxnSpPr>
           <p:cNvPr id="18" name="Conector angular 17"/>
           <p:cNvCxnSpPr>
             <a:stCxn id="224" idx="2"/>
-            <a:endCxn id="69" idx="0"/>
           </p:cNvCxnSpPr>
           <p:nvPr/>
         </p:nvCxnSpPr>
         <p:spPr>
-          <a:xfrm rot="16200000" flipH="1">
-            <a:off x="4923268" y="2806766"/>
-            <a:ext cx="328038" cy="71582"/>
+          <a:xfrm rot="5400000">
+            <a:off x="4871740" y="3045550"/>
+            <a:ext cx="333738" cy="28342"/>
           </a:xfrm>
           <a:prstGeom prst="bentConnector3">
-            <a:avLst/>
+            <a:avLst>
+              <a:gd name="adj1" fmla="val 50000"/>
+            </a:avLst>
           </a:prstGeom>
           <a:ln>
             <a:tailEnd type="triangle"/>
@@ -5585,18 +5434,20 @@
         <p:nvCxnSpPr>
           <p:cNvPr id="21" name="Conector angular 20"/>
           <p:cNvCxnSpPr>
-            <a:stCxn id="69" idx="2"/>
+            <a:stCxn id="106" idx="2"/>
             <a:endCxn id="58" idx="0"/>
           </p:cNvCxnSpPr>
           <p:nvPr/>
         </p:nvCxnSpPr>
         <p:spPr>
           <a:xfrm rot="5400000">
-            <a:off x="4833178" y="3508764"/>
-            <a:ext cx="483455" cy="96346"/>
+            <a:off x="4897633" y="3849884"/>
+            <a:ext cx="428628" cy="39296"/>
           </a:xfrm>
           <a:prstGeom prst="bentConnector3">
-            <a:avLst/>
+            <a:avLst>
+              <a:gd name="adj1" fmla="val 50000"/>
+            </a:avLst>
           </a:prstGeom>
           <a:ln>
             <a:tailEnd type="triangle"/>
@@ -5699,10 +5550,61 @@
           </a:p>
         </p:txBody>
       </p:sp>
+      <p:sp>
+        <p:nvSpPr>
+          <p:cNvPr id="106" name="105 Proceso"/>
+          <p:cNvSpPr/>
+          <p:nvPr/>
+        </p:nvSpPr>
+        <p:spPr>
+          <a:xfrm>
+            <a:off x="4667248" y="3226590"/>
+            <a:ext cx="928694" cy="428628"/>
+          </a:xfrm>
+          <a:prstGeom prst="flowChartProcess">
+            <a:avLst/>
+          </a:prstGeom>
+          <a:solidFill>
+            <a:schemeClr val="accent2"/>
+          </a:solidFill>
+          <a:ln>
+            <a:solidFill>
+              <a:srgbClr val="C00000"/>
+            </a:solidFill>
+          </a:ln>
+        </p:spPr>
+        <p:style>
+          <a:lnRef idx="2">
+            <a:schemeClr val="accent3">
+              <a:shade val="50000"/>
+            </a:schemeClr>
+          </a:lnRef>
+          <a:fillRef idx="1">
+            <a:schemeClr val="accent3"/>
+          </a:fillRef>
+          <a:effectRef idx="0">
+            <a:schemeClr val="accent3"/>
+          </a:effectRef>
+          <a:fontRef idx="minor">
+            <a:schemeClr val="lt1"/>
+          </a:fontRef>
+        </p:style>
+        <p:txBody>
+          <a:bodyPr lIns="91423" tIns="45711" rIns="91423" bIns="45711" rtlCol="0" anchor="ctr"/>
+          <a:lstStyle/>
+          <a:p>
+            <a:pPr algn="ctr"/>
+            <a:r>
+              <a:rPr lang="es-AR" sz="800" dirty="0" smtClean="0"/>
+              <a:t>Proceso Diagnóstico de Paciente</a:t>
+            </a:r>
+          </a:p>
+        </p:txBody>
+      </p:sp>
     </p:spTree>
     <p:extLst>
       <p:ext uri="{BB962C8B-B14F-4D97-AF65-F5344CB8AC3E}">
-        <p14:creationId xmlns:p14="http://schemas.microsoft.com/office/powerpoint/2010/main" val="688460289"/>
+        <p14:creationId xmlns:p14="http://schemas.microsoft.com/office/powerpoint/2010/main" xmlns="" val="688460289"/>
       </p:ext>
     </p:extLst>
   </p:cSld>
@@ -7734,7 +7636,7 @@
     </p:spTree>
     <p:extLst>
       <p:ext uri="{BB962C8B-B14F-4D97-AF65-F5344CB8AC3E}">
-        <p14:creationId xmlns:p14="http://schemas.microsoft.com/office/powerpoint/2010/main" val="1085024855"/>
+        <p14:creationId xmlns:p14="http://schemas.microsoft.com/office/powerpoint/2010/main" xmlns="" val="1085024855"/>
       </p:ext>
     </p:extLst>
   </p:cSld>
@@ -10203,6 +10105,2021 @@
           </a:fontRef>
         </p:style>
       </p:cxnSp>
+    </p:spTree>
+  </p:cSld>
+  <p:clrMapOvr>
+    <a:masterClrMapping/>
+  </p:clrMapOvr>
+  <p:timing>
+    <p:tnLst>
+      <p:par>
+        <p:cTn id="1" dur="indefinite" restart="never" nodeType="tmRoot"/>
+      </p:par>
+    </p:tnLst>
+  </p:timing>
+</p:sld>
+</file>
+
+<file path=ppt/slides/slide4.xml><?xml version="1.0" encoding="utf-8"?>
+<p:sld xmlns:a="http://schemas.openxmlformats.org/drawingml/2006/main" xmlns:r="http://schemas.openxmlformats.org/officeDocument/2006/relationships" xmlns:p="http://schemas.openxmlformats.org/presentationml/2006/main">
+  <p:cSld>
+    <p:bg>
+      <p:bgPr>
+        <a:solidFill>
+          <a:schemeClr val="accent3">
+            <a:lumMod val="20000"/>
+            <a:lumOff val="80000"/>
+          </a:schemeClr>
+        </a:solidFill>
+        <a:effectLst/>
+      </p:bgPr>
+    </p:bg>
+    <p:spTree>
+      <p:nvGrpSpPr>
+        <p:cNvPr id="1" name=""/>
+        <p:cNvGrpSpPr/>
+        <p:nvPr/>
+      </p:nvGrpSpPr>
+      <p:grpSpPr>
+        <a:xfrm>
+          <a:off x="0" y="0"/>
+          <a:ext cx="0" cy="0"/>
+          <a:chOff x="0" y="0"/>
+          <a:chExt cx="0" cy="0"/>
+        </a:xfrm>
+      </p:grpSpPr>
+      <p:sp>
+        <p:nvSpPr>
+          <p:cNvPr id="4" name="3 Proceso"/>
+          <p:cNvSpPr/>
+          <p:nvPr/>
+        </p:nvSpPr>
+        <p:spPr>
+          <a:xfrm>
+            <a:off x="1951732" y="1393557"/>
+            <a:ext cx="882022" cy="428628"/>
+          </a:xfrm>
+          <a:prstGeom prst="flowChartProcess">
+            <a:avLst/>
+          </a:prstGeom>
+        </p:spPr>
+        <p:style>
+          <a:lnRef idx="2">
+            <a:schemeClr val="accent5">
+              <a:shade val="50000"/>
+            </a:schemeClr>
+          </a:lnRef>
+          <a:fillRef idx="1">
+            <a:schemeClr val="accent5"/>
+          </a:fillRef>
+          <a:effectRef idx="0">
+            <a:schemeClr val="accent5"/>
+          </a:effectRef>
+          <a:fontRef idx="minor">
+            <a:schemeClr val="lt1"/>
+          </a:fontRef>
+        </p:style>
+        <p:txBody>
+          <a:bodyPr lIns="91423" tIns="45711" rIns="91423" bIns="45711" rtlCol="0" anchor="ctr"/>
+          <a:lstStyle/>
+          <a:p>
+            <a:pPr algn="ctr"/>
+            <a:r>
+              <a:rPr lang="es-AR" sz="800" dirty="0" smtClean="0"/>
+              <a:t>Alumno Busca Paciente en el Sistema</a:t>
+            </a:r>
+          </a:p>
+        </p:txBody>
+      </p:sp>
+      <p:sp>
+        <p:nvSpPr>
+          <p:cNvPr id="5" name="4 Proceso"/>
+          <p:cNvSpPr/>
+          <p:nvPr/>
+        </p:nvSpPr>
+        <p:spPr>
+          <a:xfrm>
+            <a:off x="3238488" y="2155020"/>
+            <a:ext cx="719453" cy="411137"/>
+          </a:xfrm>
+          <a:prstGeom prst="flowChartProcess">
+            <a:avLst/>
+          </a:prstGeom>
+        </p:spPr>
+        <p:style>
+          <a:lnRef idx="2">
+            <a:schemeClr val="accent3">
+              <a:shade val="50000"/>
+            </a:schemeClr>
+          </a:lnRef>
+          <a:fillRef idx="1">
+            <a:schemeClr val="accent3"/>
+          </a:fillRef>
+          <a:effectRef idx="0">
+            <a:schemeClr val="accent3"/>
+          </a:effectRef>
+          <a:fontRef idx="minor">
+            <a:schemeClr val="lt1"/>
+          </a:fontRef>
+        </p:style>
+        <p:txBody>
+          <a:bodyPr lIns="91423" tIns="45711" rIns="91423" bIns="45711" rtlCol="0" anchor="ctr"/>
+          <a:lstStyle/>
+          <a:p>
+            <a:pPr algn="ctr"/>
+            <a:r>
+              <a:rPr lang="es-AR" sz="800" dirty="0" smtClean="0"/>
+              <a:t>Alumno Contacta Paciente</a:t>
+            </a:r>
+            <a:endParaRPr lang="es-AR" sz="800" dirty="0"/>
+          </a:p>
+        </p:txBody>
+      </p:sp>
+      <p:cxnSp>
+        <p:nvCxnSpPr>
+          <p:cNvPr id="14" name="13 Conector angular"/>
+          <p:cNvCxnSpPr>
+            <a:stCxn id="66" idx="2"/>
+            <a:endCxn id="40" idx="1"/>
+          </p:cNvCxnSpPr>
+          <p:nvPr/>
+        </p:nvCxnSpPr>
+        <p:spPr>
+          <a:xfrm rot="16200000" flipH="1">
+            <a:off x="4661432" y="4976131"/>
+            <a:ext cx="1397526" cy="328618"/>
+          </a:xfrm>
+          <a:prstGeom prst="bentConnector2">
+            <a:avLst/>
+          </a:prstGeom>
+          <a:ln>
+            <a:tailEnd type="arrow"/>
+          </a:ln>
+        </p:spPr>
+        <p:style>
+          <a:lnRef idx="1">
+            <a:schemeClr val="accent1"/>
+          </a:lnRef>
+          <a:fillRef idx="0">
+            <a:schemeClr val="accent1"/>
+          </a:fillRef>
+          <a:effectRef idx="0">
+            <a:schemeClr val="accent1"/>
+          </a:effectRef>
+          <a:fontRef idx="minor">
+            <a:schemeClr val="tx1"/>
+          </a:fontRef>
+        </p:style>
+      </p:cxnSp>
+      <p:pic>
+        <p:nvPicPr>
+          <p:cNvPr id="15" name="Picture 4" descr="C:\Users\Enzo\Desktop\safari.png"/>
+          <p:cNvPicPr>
+            <a:picLocks noChangeAspect="1" noChangeArrowheads="1"/>
+          </p:cNvPicPr>
+          <p:nvPr/>
+        </p:nvPicPr>
+        <p:blipFill>
+          <a:blip r:embed="rId2" cstate="print"/>
+          <a:srcRect/>
+          <a:stretch>
+            <a:fillRect/>
+          </a:stretch>
+        </p:blipFill>
+        <p:spPr bwMode="auto">
+          <a:xfrm>
+            <a:off x="1452790" y="3240041"/>
+            <a:ext cx="941355" cy="636468"/>
+          </a:xfrm>
+          <a:prstGeom prst="rect">
+            <a:avLst/>
+          </a:prstGeom>
+          <a:noFill/>
+        </p:spPr>
+      </p:pic>
+      <p:cxnSp>
+        <p:nvCxnSpPr>
+          <p:cNvPr id="17" name="16 Conector recto de flecha"/>
+          <p:cNvCxnSpPr>
+            <a:stCxn id="15" idx="1"/>
+            <a:endCxn id="32" idx="0"/>
+          </p:cNvCxnSpPr>
+          <p:nvPr/>
+        </p:nvCxnSpPr>
+        <p:spPr>
+          <a:xfrm rot="10800000" flipV="1">
+            <a:off x="738158" y="3558274"/>
+            <a:ext cx="714632" cy="739885"/>
+          </a:xfrm>
+          <a:prstGeom prst="bentConnector2">
+            <a:avLst/>
+          </a:prstGeom>
+          <a:ln>
+            <a:prstDash val="dash"/>
+            <a:tailEnd type="arrow"/>
+          </a:ln>
+        </p:spPr>
+        <p:style>
+          <a:lnRef idx="1">
+            <a:schemeClr val="accent1"/>
+          </a:lnRef>
+          <a:fillRef idx="0">
+            <a:schemeClr val="accent1"/>
+          </a:fillRef>
+          <a:effectRef idx="0">
+            <a:schemeClr val="accent1"/>
+          </a:effectRef>
+          <a:fontRef idx="minor">
+            <a:schemeClr val="tx1"/>
+          </a:fontRef>
+        </p:style>
+      </p:cxnSp>
+      <p:cxnSp>
+        <p:nvCxnSpPr>
+          <p:cNvPr id="18" name="17 Conector recto de flecha"/>
+          <p:cNvCxnSpPr>
+            <a:stCxn id="4" idx="3"/>
+            <a:endCxn id="144" idx="1"/>
+          </p:cNvCxnSpPr>
+          <p:nvPr/>
+        </p:nvCxnSpPr>
+        <p:spPr>
+          <a:xfrm>
+            <a:off x="2833754" y="1607871"/>
+            <a:ext cx="404735" cy="65466"/>
+          </a:xfrm>
+          <a:prstGeom prst="bentConnector3">
+            <a:avLst>
+              <a:gd name="adj1" fmla="val 50000"/>
+            </a:avLst>
+          </a:prstGeom>
+          <a:ln>
+            <a:tailEnd type="arrow"/>
+          </a:ln>
+        </p:spPr>
+        <p:style>
+          <a:lnRef idx="1">
+            <a:schemeClr val="accent1"/>
+          </a:lnRef>
+          <a:fillRef idx="0">
+            <a:schemeClr val="accent1"/>
+          </a:fillRef>
+          <a:effectRef idx="0">
+            <a:schemeClr val="accent1"/>
+          </a:effectRef>
+          <a:fontRef idx="minor">
+            <a:schemeClr val="tx1"/>
+          </a:fontRef>
+        </p:style>
+      </p:cxnSp>
+      <p:cxnSp>
+        <p:nvCxnSpPr>
+          <p:cNvPr id="19" name="18 Conector recto de flecha"/>
+          <p:cNvCxnSpPr>
+            <a:stCxn id="5" idx="3"/>
+            <a:endCxn id="126" idx="1"/>
+          </p:cNvCxnSpPr>
+          <p:nvPr/>
+        </p:nvCxnSpPr>
+        <p:spPr>
+          <a:xfrm flipV="1">
+            <a:off x="3957941" y="2333615"/>
+            <a:ext cx="494993" cy="26974"/>
+          </a:xfrm>
+          <a:prstGeom prst="bentConnector3">
+            <a:avLst>
+              <a:gd name="adj1" fmla="val 50000"/>
+            </a:avLst>
+          </a:prstGeom>
+          <a:ln>
+            <a:tailEnd type="arrow"/>
+          </a:ln>
+        </p:spPr>
+        <p:style>
+          <a:lnRef idx="1">
+            <a:schemeClr val="accent1"/>
+          </a:lnRef>
+          <a:fillRef idx="0">
+            <a:schemeClr val="accent1"/>
+          </a:fillRef>
+          <a:effectRef idx="0">
+            <a:schemeClr val="accent1"/>
+          </a:effectRef>
+          <a:fontRef idx="minor">
+            <a:schemeClr val="tx1"/>
+          </a:fontRef>
+        </p:style>
+      </p:cxnSp>
+      <p:sp>
+        <p:nvSpPr>
+          <p:cNvPr id="25" name="24 Terminador"/>
+          <p:cNvSpPr/>
+          <p:nvPr/>
+        </p:nvSpPr>
+        <p:spPr>
+          <a:xfrm>
+            <a:off x="2480461" y="297632"/>
+            <a:ext cx="686590" cy="224565"/>
+          </a:xfrm>
+          <a:prstGeom prst="flowChartTerminator">
+            <a:avLst/>
+          </a:prstGeom>
+        </p:spPr>
+        <p:style>
+          <a:lnRef idx="2">
+            <a:schemeClr val="accent6">
+              <a:shade val="50000"/>
+            </a:schemeClr>
+          </a:lnRef>
+          <a:fillRef idx="1">
+            <a:schemeClr val="accent6"/>
+          </a:fillRef>
+          <a:effectRef idx="0">
+            <a:schemeClr val="accent6"/>
+          </a:effectRef>
+          <a:fontRef idx="minor">
+            <a:schemeClr val="lt1"/>
+          </a:fontRef>
+        </p:style>
+        <p:txBody>
+          <a:bodyPr lIns="91423" tIns="45711" rIns="91423" bIns="45711" rtlCol="0" anchor="ctr"/>
+          <a:lstStyle/>
+          <a:p>
+            <a:pPr algn="ctr"/>
+            <a:r>
+              <a:rPr lang="es-AR" sz="1000" dirty="0" smtClean="0"/>
+              <a:t>Inicio</a:t>
+            </a:r>
+            <a:endParaRPr lang="es-AR" sz="1100" dirty="0"/>
+          </a:p>
+        </p:txBody>
+      </p:sp>
+      <p:sp>
+        <p:nvSpPr>
+          <p:cNvPr id="26" name="25 Proceso"/>
+          <p:cNvSpPr/>
+          <p:nvPr/>
+        </p:nvSpPr>
+        <p:spPr>
+          <a:xfrm>
+            <a:off x="6705597" y="1870979"/>
+            <a:ext cx="857256" cy="500066"/>
+          </a:xfrm>
+          <a:prstGeom prst="flowChartProcess">
+            <a:avLst/>
+          </a:prstGeom>
+          <a:solidFill>
+            <a:schemeClr val="accent2"/>
+          </a:solidFill>
+          <a:ln>
+            <a:solidFill>
+              <a:srgbClr val="C00000"/>
+            </a:solidFill>
+          </a:ln>
+        </p:spPr>
+        <p:style>
+          <a:lnRef idx="2">
+            <a:schemeClr val="accent3">
+              <a:shade val="50000"/>
+            </a:schemeClr>
+          </a:lnRef>
+          <a:fillRef idx="1">
+            <a:schemeClr val="accent3"/>
+          </a:fillRef>
+          <a:effectRef idx="0">
+            <a:schemeClr val="accent3"/>
+          </a:effectRef>
+          <a:fontRef idx="minor">
+            <a:schemeClr val="lt1"/>
+          </a:fontRef>
+        </p:style>
+        <p:txBody>
+          <a:bodyPr lIns="91423" tIns="45711" rIns="91423" bIns="45711" rtlCol="0" anchor="ctr"/>
+          <a:lstStyle/>
+          <a:p>
+            <a:pPr algn="ctr"/>
+            <a:r>
+              <a:rPr lang="es-AR" sz="800" dirty="0" smtClean="0"/>
+              <a:t>Llegada Alumno con Paciente Sin Registrar</a:t>
+            </a:r>
+          </a:p>
+          <a:p>
+            <a:pPr algn="ctr"/>
+            <a:endParaRPr lang="es-AR" sz="800" dirty="0" smtClean="0"/>
+          </a:p>
+        </p:txBody>
+      </p:sp>
+      <p:cxnSp>
+        <p:nvCxnSpPr>
+          <p:cNvPr id="27" name="26 Conector angular"/>
+          <p:cNvCxnSpPr>
+            <a:stCxn id="25" idx="2"/>
+            <a:endCxn id="26" idx="0"/>
+          </p:cNvCxnSpPr>
+          <p:nvPr/>
+        </p:nvCxnSpPr>
+        <p:spPr>
+          <a:xfrm rot="16200000" flipH="1">
+            <a:off x="4304599" y="-958647"/>
+            <a:ext cx="1348782" cy="4310469"/>
+          </a:xfrm>
+          <a:prstGeom prst="bentConnector3">
+            <a:avLst>
+              <a:gd name="adj1" fmla="val 16054"/>
+            </a:avLst>
+          </a:prstGeom>
+          <a:ln>
+            <a:tailEnd type="arrow"/>
+          </a:ln>
+        </p:spPr>
+        <p:style>
+          <a:lnRef idx="1">
+            <a:schemeClr val="accent1"/>
+          </a:lnRef>
+          <a:fillRef idx="0">
+            <a:schemeClr val="accent1"/>
+          </a:fillRef>
+          <a:effectRef idx="0">
+            <a:schemeClr val="accent1"/>
+          </a:effectRef>
+          <a:fontRef idx="minor">
+            <a:schemeClr val="tx1"/>
+          </a:fontRef>
+        </p:style>
+      </p:cxnSp>
+      <p:cxnSp>
+        <p:nvCxnSpPr>
+          <p:cNvPr id="28" name="27 Conector angular"/>
+          <p:cNvCxnSpPr>
+            <a:stCxn id="25" idx="2"/>
+            <a:endCxn id="4" idx="1"/>
+          </p:cNvCxnSpPr>
+          <p:nvPr/>
+        </p:nvCxnSpPr>
+        <p:spPr>
+          <a:xfrm rot="5400000">
+            <a:off x="1844907" y="629022"/>
+            <a:ext cx="1085674" cy="872024"/>
+          </a:xfrm>
+          <a:prstGeom prst="bentConnector4">
+            <a:avLst>
+              <a:gd name="adj1" fmla="val 40130"/>
+              <a:gd name="adj2" fmla="val 126215"/>
+            </a:avLst>
+          </a:prstGeom>
+          <a:ln>
+            <a:tailEnd type="arrow"/>
+          </a:ln>
+        </p:spPr>
+        <p:style>
+          <a:lnRef idx="1">
+            <a:schemeClr val="accent1"/>
+          </a:lnRef>
+          <a:fillRef idx="0">
+            <a:schemeClr val="accent1"/>
+          </a:fillRef>
+          <a:effectRef idx="0">
+            <a:schemeClr val="accent1"/>
+          </a:effectRef>
+          <a:fontRef idx="minor">
+            <a:schemeClr val="tx1"/>
+          </a:fontRef>
+        </p:style>
+      </p:cxnSp>
+      <p:grpSp>
+        <p:nvGrpSpPr>
+          <p:cNvPr id="2" name="30 Grupo"/>
+          <p:cNvGrpSpPr/>
+          <p:nvPr/>
+        </p:nvGrpSpPr>
+        <p:grpSpPr>
+          <a:xfrm>
+            <a:off x="166654" y="4298160"/>
+            <a:ext cx="1214446" cy="1359581"/>
+            <a:chOff x="4738686" y="2012144"/>
+            <a:chExt cx="1214446" cy="1359581"/>
+          </a:xfrm>
+        </p:grpSpPr>
+        <p:pic>
+          <p:nvPicPr>
+            <p:cNvPr id="32" name="Picture 2" descr="C:\Users\Enzo\Desktop\Database-icon.png"/>
+            <p:cNvPicPr>
+              <a:picLocks noChangeAspect="1" noChangeArrowheads="1"/>
+            </p:cNvPicPr>
+            <p:nvPr/>
+          </p:nvPicPr>
+          <p:blipFill>
+            <a:blip r:embed="rId3" cstate="print"/>
+            <a:srcRect/>
+            <a:stretch>
+              <a:fillRect/>
+            </a:stretch>
+          </p:blipFill>
+          <p:spPr bwMode="auto">
+            <a:xfrm>
+              <a:off x="4810124" y="2012144"/>
+              <a:ext cx="1000132" cy="1000132"/>
+            </a:xfrm>
+            <a:prstGeom prst="rect">
+              <a:avLst/>
+            </a:prstGeom>
+            <a:noFill/>
+          </p:spPr>
+        </p:pic>
+        <p:sp>
+          <p:nvSpPr>
+            <p:cNvPr id="33" name="32 CuadroTexto"/>
+            <p:cNvSpPr txBox="1"/>
+            <p:nvPr/>
+          </p:nvSpPr>
+          <p:spPr>
+            <a:xfrm>
+              <a:off x="4738686" y="2940838"/>
+              <a:ext cx="1214446" cy="430887"/>
+            </a:xfrm>
+            <a:prstGeom prst="rect">
+              <a:avLst/>
+            </a:prstGeom>
+            <a:noFill/>
+          </p:spPr>
+          <p:txBody>
+            <a:bodyPr wrap="square" rtlCol="0">
+              <a:spAutoFit/>
+            </a:bodyPr>
+            <a:lstStyle/>
+            <a:p>
+              <a:pPr algn="ctr"/>
+              <a:r>
+                <a:rPr lang="es-AR" sz="1100" i="1" dirty="0" smtClean="0"/>
+                <a:t>Base de Datos de Pacientes</a:t>
+              </a:r>
+              <a:endParaRPr lang="es-AR" sz="1100" i="1" dirty="0"/>
+            </a:p>
+          </p:txBody>
+        </p:sp>
+      </p:grpSp>
+      <p:sp>
+        <p:nvSpPr>
+          <p:cNvPr id="40" name="39 Terminador"/>
+          <p:cNvSpPr/>
+          <p:nvPr/>
+        </p:nvSpPr>
+        <p:spPr>
+          <a:xfrm>
+            <a:off x="5524504" y="5726920"/>
+            <a:ext cx="474911" cy="224565"/>
+          </a:xfrm>
+          <a:prstGeom prst="flowChartTerminator">
+            <a:avLst/>
+          </a:prstGeom>
+        </p:spPr>
+        <p:style>
+          <a:lnRef idx="2">
+            <a:schemeClr val="accent6">
+              <a:shade val="50000"/>
+            </a:schemeClr>
+          </a:lnRef>
+          <a:fillRef idx="1">
+            <a:schemeClr val="accent6"/>
+          </a:fillRef>
+          <a:effectRef idx="0">
+            <a:schemeClr val="accent6"/>
+          </a:effectRef>
+          <a:fontRef idx="minor">
+            <a:schemeClr val="lt1"/>
+          </a:fontRef>
+        </p:style>
+        <p:txBody>
+          <a:bodyPr lIns="91423" tIns="45711" rIns="91423" bIns="45711" rtlCol="0" anchor="ctr"/>
+          <a:lstStyle/>
+          <a:p>
+            <a:pPr algn="ctr"/>
+            <a:r>
+              <a:rPr lang="es-AR" sz="1000" dirty="0" smtClean="0"/>
+              <a:t>Fin</a:t>
+            </a:r>
+            <a:endParaRPr lang="es-AR" sz="1000" dirty="0"/>
+          </a:p>
+        </p:txBody>
+      </p:sp>
+      <p:sp>
+        <p:nvSpPr>
+          <p:cNvPr id="46" name="45 Proceso"/>
+          <p:cNvSpPr/>
+          <p:nvPr/>
+        </p:nvSpPr>
+        <p:spPr>
+          <a:xfrm>
+            <a:off x="6711581" y="2656796"/>
+            <a:ext cx="852510" cy="566743"/>
+          </a:xfrm>
+          <a:prstGeom prst="flowChartProcess">
+            <a:avLst/>
+          </a:prstGeom>
+        </p:spPr>
+        <p:style>
+          <a:lnRef idx="2">
+            <a:schemeClr val="accent3">
+              <a:shade val="50000"/>
+            </a:schemeClr>
+          </a:lnRef>
+          <a:fillRef idx="1">
+            <a:schemeClr val="accent3"/>
+          </a:fillRef>
+          <a:effectRef idx="0">
+            <a:schemeClr val="accent3"/>
+          </a:effectRef>
+          <a:fontRef idx="minor">
+            <a:schemeClr val="lt1"/>
+          </a:fontRef>
+        </p:style>
+        <p:txBody>
+          <a:bodyPr lIns="91423" tIns="45711" rIns="91423" bIns="45711" rtlCol="0" anchor="t"/>
+          <a:lstStyle/>
+          <a:p>
+            <a:pPr algn="ctr"/>
+            <a:r>
+              <a:rPr lang="es-AR" sz="1000" b="1" i="1" dirty="0" smtClean="0"/>
+              <a:t>Proceso de Registro de Pacientes</a:t>
+            </a:r>
+          </a:p>
+          <a:p>
+            <a:pPr algn="ctr"/>
+            <a:endParaRPr lang="es-AR" sz="800" dirty="0" smtClean="0"/>
+          </a:p>
+        </p:txBody>
+      </p:sp>
+      <p:cxnSp>
+        <p:nvCxnSpPr>
+          <p:cNvPr id="58" name="17 Conector recto de flecha"/>
+          <p:cNvCxnSpPr>
+            <a:stCxn id="26" idx="2"/>
+            <a:endCxn id="46" idx="0"/>
+          </p:cNvCxnSpPr>
+          <p:nvPr/>
+        </p:nvCxnSpPr>
+        <p:spPr>
+          <a:xfrm rot="16200000" flipH="1">
+            <a:off x="6993155" y="2512114"/>
+            <a:ext cx="285751" cy="3611"/>
+          </a:xfrm>
+          <a:prstGeom prst="straightConnector1">
+            <a:avLst/>
+          </a:prstGeom>
+          <a:ln>
+            <a:tailEnd type="arrow"/>
+          </a:ln>
+        </p:spPr>
+        <p:style>
+          <a:lnRef idx="1">
+            <a:schemeClr val="accent1"/>
+          </a:lnRef>
+          <a:fillRef idx="0">
+            <a:schemeClr val="accent1"/>
+          </a:fillRef>
+          <a:effectRef idx="0">
+            <a:schemeClr val="accent1"/>
+          </a:effectRef>
+          <a:fontRef idx="minor">
+            <a:schemeClr val="tx1"/>
+          </a:fontRef>
+        </p:style>
+      </p:cxnSp>
+      <p:sp>
+        <p:nvSpPr>
+          <p:cNvPr id="61" name="60 Proceso"/>
+          <p:cNvSpPr/>
+          <p:nvPr/>
+        </p:nvSpPr>
+        <p:spPr>
+          <a:xfrm>
+            <a:off x="6705597" y="3502666"/>
+            <a:ext cx="859754" cy="564848"/>
+          </a:xfrm>
+          <a:prstGeom prst="flowChartProcess">
+            <a:avLst/>
+          </a:prstGeom>
+        </p:spPr>
+        <p:style>
+          <a:lnRef idx="2">
+            <a:schemeClr val="accent5">
+              <a:shade val="50000"/>
+            </a:schemeClr>
+          </a:lnRef>
+          <a:fillRef idx="1">
+            <a:schemeClr val="accent5"/>
+          </a:fillRef>
+          <a:effectRef idx="0">
+            <a:schemeClr val="accent5"/>
+          </a:effectRef>
+          <a:fontRef idx="minor">
+            <a:schemeClr val="lt1"/>
+          </a:fontRef>
+        </p:style>
+        <p:txBody>
+          <a:bodyPr lIns="91423" tIns="45711" rIns="91423" bIns="45711" rtlCol="0" anchor="t"/>
+          <a:lstStyle/>
+          <a:p>
+            <a:pPr algn="ctr"/>
+            <a:r>
+              <a:rPr lang="es-AR" sz="800" dirty="0" smtClean="0"/>
+              <a:t>Asignar Paciente al Alumno y lo Confirma</a:t>
+            </a:r>
+          </a:p>
+          <a:p>
+            <a:pPr algn="ctr"/>
+            <a:endParaRPr lang="es-AR" sz="800" dirty="0" smtClean="0"/>
+          </a:p>
+          <a:p>
+            <a:pPr algn="ctr"/>
+            <a:endParaRPr lang="es-AR" sz="800" dirty="0"/>
+          </a:p>
+        </p:txBody>
+      </p:sp>
+      <p:cxnSp>
+        <p:nvCxnSpPr>
+          <p:cNvPr id="62" name="17 Conector recto de flecha"/>
+          <p:cNvCxnSpPr>
+            <a:stCxn id="46" idx="2"/>
+            <a:endCxn id="61" idx="0"/>
+          </p:cNvCxnSpPr>
+          <p:nvPr/>
+        </p:nvCxnSpPr>
+        <p:spPr>
+          <a:xfrm flipH="1">
+            <a:off x="7135474" y="3223539"/>
+            <a:ext cx="2362" cy="279127"/>
+          </a:xfrm>
+          <a:prstGeom prst="straightConnector1">
+            <a:avLst/>
+          </a:prstGeom>
+          <a:ln>
+            <a:tailEnd type="arrow"/>
+          </a:ln>
+        </p:spPr>
+        <p:style>
+          <a:lnRef idx="1">
+            <a:schemeClr val="accent1"/>
+          </a:lnRef>
+          <a:fillRef idx="0">
+            <a:schemeClr val="accent1"/>
+          </a:fillRef>
+          <a:effectRef idx="0">
+            <a:schemeClr val="accent1"/>
+          </a:effectRef>
+          <a:fontRef idx="minor">
+            <a:schemeClr val="tx1"/>
+          </a:fontRef>
+        </p:style>
+      </p:cxnSp>
+      <p:cxnSp>
+        <p:nvCxnSpPr>
+          <p:cNvPr id="94" name="17 Conector recto de flecha"/>
+          <p:cNvCxnSpPr>
+            <a:stCxn id="61" idx="1"/>
+            <a:endCxn id="66" idx="3"/>
+          </p:cNvCxnSpPr>
+          <p:nvPr/>
+        </p:nvCxnSpPr>
+        <p:spPr>
+          <a:xfrm rot="10800000" flipV="1">
+            <a:off x="5653087" y="3785090"/>
+            <a:ext cx="1052511" cy="390766"/>
+          </a:xfrm>
+          <a:prstGeom prst="bentConnector3">
+            <a:avLst>
+              <a:gd name="adj1" fmla="val 50000"/>
+            </a:avLst>
+          </a:prstGeom>
+          <a:ln>
+            <a:tailEnd type="arrow"/>
+          </a:ln>
+        </p:spPr>
+        <p:style>
+          <a:lnRef idx="1">
+            <a:schemeClr val="accent1"/>
+          </a:lnRef>
+          <a:fillRef idx="0">
+            <a:schemeClr val="accent1"/>
+          </a:fillRef>
+          <a:effectRef idx="0">
+            <a:schemeClr val="accent1"/>
+          </a:effectRef>
+          <a:fontRef idx="minor">
+            <a:schemeClr val="tx1"/>
+          </a:fontRef>
+        </p:style>
+      </p:cxnSp>
+      <p:cxnSp>
+        <p:nvCxnSpPr>
+          <p:cNvPr id="106" name="16 Conector recto de flecha"/>
+          <p:cNvCxnSpPr>
+            <a:stCxn id="4" idx="0"/>
+            <a:endCxn id="75" idx="1"/>
+          </p:cNvCxnSpPr>
+          <p:nvPr/>
+        </p:nvCxnSpPr>
+        <p:spPr>
+          <a:xfrm rot="5400000" flipH="1" flipV="1">
+            <a:off x="3538282" y="24098"/>
+            <a:ext cx="223921" cy="2514999"/>
+          </a:xfrm>
+          <a:prstGeom prst="bentConnector2">
+            <a:avLst/>
+          </a:prstGeom>
+          <a:ln>
+            <a:prstDash val="dash"/>
+            <a:tailEnd type="arrow"/>
+          </a:ln>
+        </p:spPr>
+        <p:style>
+          <a:lnRef idx="1">
+            <a:schemeClr val="accent1"/>
+          </a:lnRef>
+          <a:fillRef idx="0">
+            <a:schemeClr val="accent1"/>
+          </a:fillRef>
+          <a:effectRef idx="0">
+            <a:schemeClr val="accent1"/>
+          </a:effectRef>
+          <a:fontRef idx="minor">
+            <a:schemeClr val="tx1"/>
+          </a:fontRef>
+        </p:style>
+      </p:cxnSp>
+      <p:sp>
+        <p:nvSpPr>
+          <p:cNvPr id="115" name="114 Proceso"/>
+          <p:cNvSpPr/>
+          <p:nvPr/>
+        </p:nvSpPr>
+        <p:spPr>
+          <a:xfrm>
+            <a:off x="4810124" y="3083714"/>
+            <a:ext cx="785776" cy="411137"/>
+          </a:xfrm>
+          <a:prstGeom prst="flowChartProcess">
+            <a:avLst/>
+          </a:prstGeom>
+        </p:spPr>
+        <p:style>
+          <a:lnRef idx="2">
+            <a:schemeClr val="accent5">
+              <a:shade val="50000"/>
+            </a:schemeClr>
+          </a:lnRef>
+          <a:fillRef idx="1">
+            <a:schemeClr val="accent5"/>
+          </a:fillRef>
+          <a:effectRef idx="0">
+            <a:schemeClr val="accent5"/>
+          </a:effectRef>
+          <a:fontRef idx="minor">
+            <a:schemeClr val="lt1"/>
+          </a:fontRef>
+        </p:style>
+        <p:txBody>
+          <a:bodyPr lIns="91423" tIns="45711" rIns="91423" bIns="45711" rtlCol="0" anchor="t"/>
+          <a:lstStyle/>
+          <a:p>
+            <a:pPr algn="ctr"/>
+            <a:r>
+              <a:rPr lang="es-AR" sz="800" dirty="0" smtClean="0"/>
+              <a:t>Confirmación de contacto del Paciente</a:t>
+            </a:r>
+          </a:p>
+        </p:txBody>
+      </p:sp>
+      <p:cxnSp>
+        <p:nvCxnSpPr>
+          <p:cNvPr id="119" name="118 Conector recto de flecha"/>
+          <p:cNvCxnSpPr>
+            <a:stCxn id="126" idx="2"/>
+            <a:endCxn id="115" idx="0"/>
+          </p:cNvCxnSpPr>
+          <p:nvPr/>
+        </p:nvCxnSpPr>
+        <p:spPr>
+          <a:xfrm rot="5400000">
+            <a:off x="5042287" y="2887249"/>
+            <a:ext cx="357190" cy="35740"/>
+          </a:xfrm>
+          <a:prstGeom prst="bentConnector3">
+            <a:avLst>
+              <a:gd name="adj1" fmla="val 50000"/>
+            </a:avLst>
+          </a:prstGeom>
+          <a:ln>
+            <a:tailEnd type="arrow"/>
+          </a:ln>
+        </p:spPr>
+        <p:style>
+          <a:lnRef idx="1">
+            <a:schemeClr val="accent1"/>
+          </a:lnRef>
+          <a:fillRef idx="0">
+            <a:schemeClr val="accent1"/>
+          </a:fillRef>
+          <a:effectRef idx="0">
+            <a:schemeClr val="accent1"/>
+          </a:effectRef>
+          <a:fontRef idx="minor">
+            <a:schemeClr val="tx1"/>
+          </a:fontRef>
+        </p:style>
+      </p:cxnSp>
+      <p:sp>
+        <p:nvSpPr>
+          <p:cNvPr id="126" name="125 Decisión"/>
+          <p:cNvSpPr/>
+          <p:nvPr/>
+        </p:nvSpPr>
+        <p:spPr>
+          <a:xfrm>
+            <a:off x="4452934" y="1940706"/>
+            <a:ext cx="1571636" cy="785818"/>
+          </a:xfrm>
+          <a:prstGeom prst="flowChartDecision">
+            <a:avLst/>
+          </a:prstGeom>
+        </p:spPr>
+        <p:style>
+          <a:lnRef idx="2">
+            <a:schemeClr val="accent1">
+              <a:shade val="50000"/>
+            </a:schemeClr>
+          </a:lnRef>
+          <a:fillRef idx="1">
+            <a:schemeClr val="accent1"/>
+          </a:fillRef>
+          <a:effectRef idx="0">
+            <a:schemeClr val="accent1"/>
+          </a:effectRef>
+          <a:fontRef idx="minor">
+            <a:schemeClr val="lt1"/>
+          </a:fontRef>
+        </p:style>
+        <p:txBody>
+          <a:bodyPr lIns="91429" tIns="45714" rIns="91429" bIns="45714" rtlCol="0" anchor="ctr"/>
+          <a:lstStyle/>
+          <a:p>
+            <a:pPr algn="ctr"/>
+            <a:r>
+              <a:rPr lang="es-AR" sz="800" dirty="0" smtClean="0"/>
+              <a:t>¿Confirma  contacto con Paciente</a:t>
+            </a:r>
+          </a:p>
+          <a:p>
+            <a:pPr algn="ctr"/>
+            <a:r>
+              <a:rPr lang="es-AR" sz="800" dirty="0" smtClean="0"/>
+              <a:t>?</a:t>
+            </a:r>
+            <a:endParaRPr lang="es-AR" sz="800" dirty="0"/>
+          </a:p>
+        </p:txBody>
+      </p:sp>
+      <p:cxnSp>
+        <p:nvCxnSpPr>
+          <p:cNvPr id="130" name="18 Conector recto de flecha"/>
+          <p:cNvCxnSpPr>
+            <a:stCxn id="126" idx="3"/>
+            <a:endCxn id="138" idx="0"/>
+          </p:cNvCxnSpPr>
+          <p:nvPr/>
+        </p:nvCxnSpPr>
+        <p:spPr>
+          <a:xfrm>
+            <a:off x="6024570" y="2333615"/>
+            <a:ext cx="392889" cy="2464611"/>
+          </a:xfrm>
+          <a:prstGeom prst="bentConnector2">
+            <a:avLst/>
+          </a:prstGeom>
+          <a:ln>
+            <a:tailEnd type="arrow"/>
+          </a:ln>
+        </p:spPr>
+        <p:style>
+          <a:lnRef idx="1">
+            <a:schemeClr val="accent1"/>
+          </a:lnRef>
+          <a:fillRef idx="0">
+            <a:schemeClr val="accent1"/>
+          </a:fillRef>
+          <a:effectRef idx="0">
+            <a:schemeClr val="accent1"/>
+          </a:effectRef>
+          <a:fontRef idx="minor">
+            <a:schemeClr val="tx1"/>
+          </a:fontRef>
+        </p:style>
+      </p:cxnSp>
+      <p:sp>
+        <p:nvSpPr>
+          <p:cNvPr id="138" name="137 Proceso"/>
+          <p:cNvSpPr/>
+          <p:nvPr/>
+        </p:nvSpPr>
+        <p:spPr>
+          <a:xfrm>
+            <a:off x="6024571" y="4798226"/>
+            <a:ext cx="785776" cy="411137"/>
+          </a:xfrm>
+          <a:prstGeom prst="flowChartProcess">
+            <a:avLst/>
+          </a:prstGeom>
+        </p:spPr>
+        <p:style>
+          <a:lnRef idx="2">
+            <a:schemeClr val="accent5">
+              <a:shade val="50000"/>
+            </a:schemeClr>
+          </a:lnRef>
+          <a:fillRef idx="1">
+            <a:schemeClr val="accent5"/>
+          </a:fillRef>
+          <a:effectRef idx="0">
+            <a:schemeClr val="accent5"/>
+          </a:effectRef>
+          <a:fontRef idx="minor">
+            <a:schemeClr val="lt1"/>
+          </a:fontRef>
+        </p:style>
+        <p:txBody>
+          <a:bodyPr lIns="91423" tIns="45711" rIns="91423" bIns="45711" rtlCol="0" anchor="t"/>
+          <a:lstStyle/>
+          <a:p>
+            <a:pPr algn="ctr"/>
+            <a:r>
+              <a:rPr lang="es-AR" sz="800" dirty="0" smtClean="0"/>
+              <a:t>Alumno Libera  Paciente</a:t>
+            </a:r>
+          </a:p>
+        </p:txBody>
+      </p:sp>
+      <p:cxnSp>
+        <p:nvCxnSpPr>
+          <p:cNvPr id="139" name="22 Conector recto de flecha"/>
+          <p:cNvCxnSpPr>
+            <a:stCxn id="138" idx="2"/>
+            <a:endCxn id="40" idx="0"/>
+          </p:cNvCxnSpPr>
+          <p:nvPr/>
+        </p:nvCxnSpPr>
+        <p:spPr>
+          <a:xfrm rot="5400000">
+            <a:off x="5830932" y="5140392"/>
+            <a:ext cx="517557" cy="655499"/>
+          </a:xfrm>
+          <a:prstGeom prst="bentConnector3">
+            <a:avLst>
+              <a:gd name="adj1" fmla="val 50000"/>
+            </a:avLst>
+          </a:prstGeom>
+          <a:ln>
+            <a:tailEnd type="arrow"/>
+          </a:ln>
+        </p:spPr>
+        <p:style>
+          <a:lnRef idx="1">
+            <a:schemeClr val="accent1"/>
+          </a:lnRef>
+          <a:fillRef idx="0">
+            <a:schemeClr val="accent1"/>
+          </a:fillRef>
+          <a:effectRef idx="0">
+            <a:schemeClr val="accent1"/>
+          </a:effectRef>
+          <a:fontRef idx="minor">
+            <a:schemeClr val="tx1"/>
+          </a:fontRef>
+        </p:style>
+      </p:cxnSp>
+      <p:sp>
+        <p:nvSpPr>
+          <p:cNvPr id="144" name="143 Proceso"/>
+          <p:cNvSpPr/>
+          <p:nvPr/>
+        </p:nvSpPr>
+        <p:spPr>
+          <a:xfrm>
+            <a:off x="3238489" y="1459023"/>
+            <a:ext cx="785818" cy="428628"/>
+          </a:xfrm>
+          <a:prstGeom prst="flowChartProcess">
+            <a:avLst/>
+          </a:prstGeom>
+        </p:spPr>
+        <p:style>
+          <a:lnRef idx="2">
+            <a:schemeClr val="accent5">
+              <a:shade val="50000"/>
+            </a:schemeClr>
+          </a:lnRef>
+          <a:fillRef idx="1">
+            <a:schemeClr val="accent5"/>
+          </a:fillRef>
+          <a:effectRef idx="0">
+            <a:schemeClr val="accent5"/>
+          </a:effectRef>
+          <a:fontRef idx="minor">
+            <a:schemeClr val="lt1"/>
+          </a:fontRef>
+        </p:style>
+        <p:txBody>
+          <a:bodyPr lIns="91423" tIns="45711" rIns="91423" bIns="45711" rtlCol="0" anchor="t"/>
+          <a:lstStyle/>
+          <a:p>
+            <a:pPr algn="ctr"/>
+            <a:r>
+              <a:rPr lang="es-AR" sz="800" dirty="0" smtClean="0"/>
+              <a:t>Alumno Asigna Paciente</a:t>
+            </a:r>
+          </a:p>
+          <a:p>
+            <a:pPr algn="ctr"/>
+            <a:endParaRPr lang="es-AR" sz="800" dirty="0"/>
+          </a:p>
+        </p:txBody>
+      </p:sp>
+      <p:cxnSp>
+        <p:nvCxnSpPr>
+          <p:cNvPr id="146" name="17 Conector recto de flecha"/>
+          <p:cNvCxnSpPr>
+            <a:stCxn id="144" idx="2"/>
+            <a:endCxn id="5" idx="0"/>
+          </p:cNvCxnSpPr>
+          <p:nvPr/>
+        </p:nvCxnSpPr>
+        <p:spPr>
+          <a:xfrm rot="5400000">
+            <a:off x="3481123" y="2004744"/>
+            <a:ext cx="267369" cy="33183"/>
+          </a:xfrm>
+          <a:prstGeom prst="bentConnector3">
+            <a:avLst>
+              <a:gd name="adj1" fmla="val 50000"/>
+            </a:avLst>
+          </a:prstGeom>
+          <a:ln>
+            <a:tailEnd type="arrow"/>
+          </a:ln>
+        </p:spPr>
+        <p:style>
+          <a:lnRef idx="1">
+            <a:schemeClr val="accent1"/>
+          </a:lnRef>
+          <a:fillRef idx="0">
+            <a:schemeClr val="accent1"/>
+          </a:fillRef>
+          <a:effectRef idx="0">
+            <a:schemeClr val="accent1"/>
+          </a:effectRef>
+          <a:fontRef idx="minor">
+            <a:schemeClr val="tx1"/>
+          </a:fontRef>
+        </p:style>
+      </p:cxnSp>
+      <p:cxnSp>
+        <p:nvCxnSpPr>
+          <p:cNvPr id="150" name="118 Conector recto de flecha"/>
+          <p:cNvCxnSpPr>
+            <a:stCxn id="115" idx="2"/>
+            <a:endCxn id="66" idx="0"/>
+          </p:cNvCxnSpPr>
+          <p:nvPr/>
+        </p:nvCxnSpPr>
+        <p:spPr>
+          <a:xfrm rot="5400000">
+            <a:off x="5012109" y="3678628"/>
+            <a:ext cx="374681" cy="7126"/>
+          </a:xfrm>
+          <a:prstGeom prst="bentConnector3">
+            <a:avLst>
+              <a:gd name="adj1" fmla="val 50000"/>
+            </a:avLst>
+          </a:prstGeom>
+          <a:ln>
+            <a:tailEnd type="arrow"/>
+          </a:ln>
+        </p:spPr>
+        <p:style>
+          <a:lnRef idx="1">
+            <a:schemeClr val="accent1"/>
+          </a:lnRef>
+          <a:fillRef idx="0">
+            <a:schemeClr val="accent1"/>
+          </a:fillRef>
+          <a:effectRef idx="0">
+            <a:schemeClr val="accent1"/>
+          </a:effectRef>
+          <a:fontRef idx="minor">
+            <a:schemeClr val="tx1"/>
+          </a:fontRef>
+        </p:style>
+      </p:cxnSp>
+      <p:cxnSp>
+        <p:nvCxnSpPr>
+          <p:cNvPr id="154" name="16 Conector recto de flecha"/>
+          <p:cNvCxnSpPr>
+            <a:stCxn id="144" idx="3"/>
+            <a:endCxn id="75" idx="2"/>
+          </p:cNvCxnSpPr>
+          <p:nvPr/>
+        </p:nvCxnSpPr>
+        <p:spPr>
+          <a:xfrm flipV="1">
+            <a:off x="4024307" y="1487870"/>
+            <a:ext cx="1354113" cy="185467"/>
+          </a:xfrm>
+          <a:prstGeom prst="bentConnector2">
+            <a:avLst/>
+          </a:prstGeom>
+          <a:ln>
+            <a:prstDash val="dash"/>
+            <a:tailEnd type="arrow"/>
+          </a:ln>
+        </p:spPr>
+        <p:style>
+          <a:lnRef idx="1">
+            <a:schemeClr val="accent1"/>
+          </a:lnRef>
+          <a:fillRef idx="0">
+            <a:schemeClr val="accent1"/>
+          </a:fillRef>
+          <a:effectRef idx="0">
+            <a:schemeClr val="accent1"/>
+          </a:effectRef>
+          <a:fontRef idx="minor">
+            <a:schemeClr val="tx1"/>
+          </a:fontRef>
+        </p:style>
+      </p:cxnSp>
+      <p:cxnSp>
+        <p:nvCxnSpPr>
+          <p:cNvPr id="157" name="16 Conector recto de flecha"/>
+          <p:cNvCxnSpPr>
+            <a:stCxn id="115" idx="1"/>
+            <a:endCxn id="15" idx="2"/>
+          </p:cNvCxnSpPr>
+          <p:nvPr/>
+        </p:nvCxnSpPr>
+        <p:spPr>
+          <a:xfrm rot="10800000" flipV="1">
+            <a:off x="1923468" y="3289283"/>
+            <a:ext cx="2886656" cy="587226"/>
+          </a:xfrm>
+          <a:prstGeom prst="bentConnector4">
+            <a:avLst>
+              <a:gd name="adj1" fmla="val 41847"/>
+              <a:gd name="adj2" fmla="val 138929"/>
+            </a:avLst>
+          </a:prstGeom>
+          <a:ln>
+            <a:prstDash val="dash"/>
+            <a:tailEnd type="arrow"/>
+          </a:ln>
+        </p:spPr>
+        <p:style>
+          <a:lnRef idx="1">
+            <a:schemeClr val="accent1"/>
+          </a:lnRef>
+          <a:fillRef idx="0">
+            <a:schemeClr val="accent1"/>
+          </a:fillRef>
+          <a:effectRef idx="0">
+            <a:schemeClr val="accent1"/>
+          </a:effectRef>
+          <a:fontRef idx="minor">
+            <a:schemeClr val="tx1"/>
+          </a:fontRef>
+        </p:style>
+      </p:cxnSp>
+      <p:sp>
+        <p:nvSpPr>
+          <p:cNvPr id="163" name="162 CuadroTexto"/>
+          <p:cNvSpPr txBox="1"/>
+          <p:nvPr/>
+        </p:nvSpPr>
+        <p:spPr>
+          <a:xfrm>
+            <a:off x="5238752" y="2726524"/>
+            <a:ext cx="357190" cy="261598"/>
+          </a:xfrm>
+          <a:prstGeom prst="rect">
+            <a:avLst/>
+          </a:prstGeom>
+          <a:noFill/>
+        </p:spPr>
+        <p:txBody>
+          <a:bodyPr wrap="square" lIns="91429" tIns="45714" rIns="91429" bIns="45714" rtlCol="0">
+            <a:spAutoFit/>
+          </a:bodyPr>
+          <a:lstStyle/>
+          <a:p>
+            <a:r>
+              <a:rPr lang="es-AR" sz="1100" dirty="0" smtClean="0"/>
+              <a:t>SI</a:t>
+            </a:r>
+            <a:endParaRPr lang="es-AR" dirty="0"/>
+          </a:p>
+        </p:txBody>
+      </p:sp>
+      <p:sp>
+        <p:nvSpPr>
+          <p:cNvPr id="164" name="163 CuadroTexto"/>
+          <p:cNvSpPr txBox="1"/>
+          <p:nvPr/>
+        </p:nvSpPr>
+        <p:spPr>
+          <a:xfrm>
+            <a:off x="6024570" y="2012144"/>
+            <a:ext cx="428628" cy="261598"/>
+          </a:xfrm>
+          <a:prstGeom prst="rect">
+            <a:avLst/>
+          </a:prstGeom>
+          <a:noFill/>
+        </p:spPr>
+        <p:txBody>
+          <a:bodyPr wrap="square" lIns="91429" tIns="45714" rIns="91429" bIns="45714" rtlCol="0">
+            <a:spAutoFit/>
+          </a:bodyPr>
+          <a:lstStyle/>
+          <a:p>
+            <a:r>
+              <a:rPr lang="es-AR" sz="1100" dirty="0" smtClean="0"/>
+              <a:t>NO</a:t>
+            </a:r>
+            <a:endParaRPr lang="es-AR" dirty="0"/>
+          </a:p>
+        </p:txBody>
+      </p:sp>
+      <p:cxnSp>
+        <p:nvCxnSpPr>
+          <p:cNvPr id="168" name="16 Conector recto de flecha"/>
+          <p:cNvCxnSpPr>
+            <a:stCxn id="61" idx="3"/>
+            <a:endCxn id="178" idx="0"/>
+          </p:cNvCxnSpPr>
+          <p:nvPr/>
+        </p:nvCxnSpPr>
+        <p:spPr>
+          <a:xfrm>
+            <a:off x="7565351" y="3785090"/>
+            <a:ext cx="1095956" cy="282424"/>
+          </a:xfrm>
+          <a:prstGeom prst="bentConnector2">
+            <a:avLst/>
+          </a:prstGeom>
+          <a:ln>
+            <a:prstDash val="dash"/>
+            <a:tailEnd type="arrow"/>
+          </a:ln>
+        </p:spPr>
+        <p:style>
+          <a:lnRef idx="1">
+            <a:schemeClr val="accent1"/>
+          </a:lnRef>
+          <a:fillRef idx="0">
+            <a:schemeClr val="accent1"/>
+          </a:fillRef>
+          <a:effectRef idx="0">
+            <a:schemeClr val="accent1"/>
+          </a:effectRef>
+          <a:fontRef idx="minor">
+            <a:schemeClr val="tx1"/>
+          </a:fontRef>
+        </p:style>
+      </p:cxnSp>
+      <p:pic>
+        <p:nvPicPr>
+          <p:cNvPr id="178" name="Picture 4" descr="C:\Users\Enzo\Desktop\safari.png"/>
+          <p:cNvPicPr>
+            <a:picLocks noChangeAspect="1" noChangeArrowheads="1"/>
+          </p:cNvPicPr>
+          <p:nvPr/>
+        </p:nvPicPr>
+        <p:blipFill>
+          <a:blip r:embed="rId2" cstate="print"/>
+          <a:srcRect/>
+          <a:stretch>
+            <a:fillRect/>
+          </a:stretch>
+        </p:blipFill>
+        <p:spPr bwMode="auto">
+          <a:xfrm>
+            <a:off x="8190629" y="4067514"/>
+            <a:ext cx="941355" cy="636468"/>
+          </a:xfrm>
+          <a:prstGeom prst="rect">
+            <a:avLst/>
+          </a:prstGeom>
+          <a:noFill/>
+        </p:spPr>
+      </p:pic>
+      <p:grpSp>
+        <p:nvGrpSpPr>
+          <p:cNvPr id="10" name="178 Grupo"/>
+          <p:cNvGrpSpPr/>
+          <p:nvPr/>
+        </p:nvGrpSpPr>
+        <p:grpSpPr>
+          <a:xfrm>
+            <a:off x="8096272" y="5012540"/>
+            <a:ext cx="1214446" cy="1359581"/>
+            <a:chOff x="4738686" y="2012144"/>
+            <a:chExt cx="1214446" cy="1359581"/>
+          </a:xfrm>
+        </p:grpSpPr>
+        <p:pic>
+          <p:nvPicPr>
+            <p:cNvPr id="180" name="Picture 2" descr="C:\Users\Enzo\Desktop\Database-icon.png"/>
+            <p:cNvPicPr>
+              <a:picLocks noChangeAspect="1" noChangeArrowheads="1"/>
+            </p:cNvPicPr>
+            <p:nvPr/>
+          </p:nvPicPr>
+          <p:blipFill>
+            <a:blip r:embed="rId3" cstate="print"/>
+            <a:srcRect/>
+            <a:stretch>
+              <a:fillRect/>
+            </a:stretch>
+          </p:blipFill>
+          <p:spPr bwMode="auto">
+            <a:xfrm>
+              <a:off x="4810124" y="2012144"/>
+              <a:ext cx="1000132" cy="1000132"/>
+            </a:xfrm>
+            <a:prstGeom prst="rect">
+              <a:avLst/>
+            </a:prstGeom>
+            <a:noFill/>
+          </p:spPr>
+        </p:pic>
+        <p:sp>
+          <p:nvSpPr>
+            <p:cNvPr id="181" name="180 CuadroTexto"/>
+            <p:cNvSpPr txBox="1"/>
+            <p:nvPr/>
+          </p:nvSpPr>
+          <p:spPr>
+            <a:xfrm>
+              <a:off x="4738686" y="2940838"/>
+              <a:ext cx="1214446" cy="430887"/>
+            </a:xfrm>
+            <a:prstGeom prst="rect">
+              <a:avLst/>
+            </a:prstGeom>
+            <a:noFill/>
+          </p:spPr>
+          <p:txBody>
+            <a:bodyPr wrap="square" rtlCol="0">
+              <a:spAutoFit/>
+            </a:bodyPr>
+            <a:lstStyle/>
+            <a:p>
+              <a:pPr algn="ctr"/>
+              <a:r>
+                <a:rPr lang="es-AR" sz="1100" i="1" dirty="0" smtClean="0"/>
+                <a:t>Base de Datos de Pacientes</a:t>
+              </a:r>
+              <a:endParaRPr lang="es-AR" sz="1100" i="1" dirty="0"/>
+            </a:p>
+          </p:txBody>
+        </p:sp>
+      </p:grpSp>
+      <p:cxnSp>
+        <p:nvCxnSpPr>
+          <p:cNvPr id="185" name="16 Conector recto de flecha"/>
+          <p:cNvCxnSpPr>
+            <a:stCxn id="138" idx="3"/>
+            <a:endCxn id="178" idx="1"/>
+          </p:cNvCxnSpPr>
+          <p:nvPr/>
+        </p:nvCxnSpPr>
+        <p:spPr>
+          <a:xfrm flipV="1">
+            <a:off x="6810347" y="4385748"/>
+            <a:ext cx="1380282" cy="618047"/>
+          </a:xfrm>
+          <a:prstGeom prst="bentConnector3">
+            <a:avLst>
+              <a:gd name="adj1" fmla="val 50000"/>
+            </a:avLst>
+          </a:prstGeom>
+          <a:ln>
+            <a:prstDash val="dash"/>
+            <a:tailEnd type="arrow"/>
+          </a:ln>
+        </p:spPr>
+        <p:style>
+          <a:lnRef idx="1">
+            <a:schemeClr val="accent1"/>
+          </a:lnRef>
+          <a:fillRef idx="0">
+            <a:schemeClr val="accent1"/>
+          </a:fillRef>
+          <a:effectRef idx="0">
+            <a:schemeClr val="accent1"/>
+          </a:effectRef>
+          <a:fontRef idx="minor">
+            <a:schemeClr val="tx1"/>
+          </a:fontRef>
+        </p:style>
+      </p:cxnSp>
+      <p:cxnSp>
+        <p:nvCxnSpPr>
+          <p:cNvPr id="188" name="16 Conector recto de flecha"/>
+          <p:cNvCxnSpPr>
+            <a:stCxn id="178" idx="2"/>
+            <a:endCxn id="180" idx="0"/>
+          </p:cNvCxnSpPr>
+          <p:nvPr/>
+        </p:nvCxnSpPr>
+        <p:spPr>
+          <a:xfrm rot="16200000" flipH="1">
+            <a:off x="8510262" y="4855026"/>
+            <a:ext cx="308558" cy="6469"/>
+          </a:xfrm>
+          <a:prstGeom prst="bentConnector3">
+            <a:avLst>
+              <a:gd name="adj1" fmla="val 50000"/>
+            </a:avLst>
+          </a:prstGeom>
+          <a:ln>
+            <a:prstDash val="dash"/>
+            <a:tailEnd type="arrow"/>
+          </a:ln>
+        </p:spPr>
+        <p:style>
+          <a:lnRef idx="1">
+            <a:schemeClr val="accent1"/>
+          </a:lnRef>
+          <a:fillRef idx="0">
+            <a:schemeClr val="accent1"/>
+          </a:fillRef>
+          <a:effectRef idx="0">
+            <a:schemeClr val="accent1"/>
+          </a:effectRef>
+          <a:fontRef idx="minor">
+            <a:schemeClr val="tx1"/>
+          </a:fontRef>
+        </p:style>
+      </p:cxnSp>
+      <p:sp>
+        <p:nvSpPr>
+          <p:cNvPr id="56" name="3 Proceso"/>
+          <p:cNvSpPr/>
+          <p:nvPr/>
+        </p:nvSpPr>
+        <p:spPr>
+          <a:xfrm>
+            <a:off x="238091" y="963559"/>
+            <a:ext cx="976601" cy="428628"/>
+          </a:xfrm>
+          <a:prstGeom prst="flowChartProcess">
+            <a:avLst/>
+          </a:prstGeom>
+          <a:solidFill>
+            <a:schemeClr val="accent2"/>
+          </a:solidFill>
+          <a:ln>
+            <a:solidFill>
+              <a:srgbClr val="C00000"/>
+            </a:solidFill>
+          </a:ln>
+        </p:spPr>
+        <p:style>
+          <a:lnRef idx="2">
+            <a:schemeClr val="accent3">
+              <a:shade val="50000"/>
+            </a:schemeClr>
+          </a:lnRef>
+          <a:fillRef idx="1">
+            <a:schemeClr val="accent3"/>
+          </a:fillRef>
+          <a:effectRef idx="0">
+            <a:schemeClr val="accent3"/>
+          </a:effectRef>
+          <a:fontRef idx="minor">
+            <a:schemeClr val="lt1"/>
+          </a:fontRef>
+        </p:style>
+        <p:txBody>
+          <a:bodyPr lIns="91423" tIns="45711" rIns="91423" bIns="45711" rtlCol="0" anchor="ctr"/>
+          <a:lstStyle/>
+          <a:p>
+            <a:pPr algn="ctr"/>
+            <a:r>
+              <a:rPr lang="es-AR" sz="800" dirty="0"/>
+              <a:t>Llegada Alumno Sin </a:t>
+            </a:r>
+            <a:r>
+              <a:rPr lang="es-AR" sz="800" dirty="0" smtClean="0"/>
+              <a:t>Paciente</a:t>
+            </a:r>
+            <a:r>
+              <a:rPr lang="es-AR" sz="800" dirty="0"/>
+              <a:t> </a:t>
+            </a:r>
+            <a:r>
+              <a:rPr lang="es-AR" sz="800" dirty="0" smtClean="0"/>
+              <a:t>al Área de Derivación </a:t>
+            </a:r>
+            <a:endParaRPr lang="es-AR" sz="800" dirty="0"/>
+          </a:p>
+        </p:txBody>
+      </p:sp>
+      <p:cxnSp>
+        <p:nvCxnSpPr>
+          <p:cNvPr id="3" name="Conector angular 2"/>
+          <p:cNvCxnSpPr>
+            <a:stCxn id="25" idx="2"/>
+            <a:endCxn id="56" idx="0"/>
+          </p:cNvCxnSpPr>
+          <p:nvPr/>
+        </p:nvCxnSpPr>
+        <p:spPr>
+          <a:xfrm rot="5400000">
+            <a:off x="1554393" y="-305804"/>
+            <a:ext cx="441362" cy="2097364"/>
+          </a:xfrm>
+          <a:prstGeom prst="bentConnector3">
+            <a:avLst>
+              <a:gd name="adj1" fmla="val 50000"/>
+            </a:avLst>
+          </a:prstGeom>
+          <a:ln>
+            <a:tailEnd type="triangle"/>
+          </a:ln>
+        </p:spPr>
+        <p:style>
+          <a:lnRef idx="1">
+            <a:schemeClr val="accent1"/>
+          </a:lnRef>
+          <a:fillRef idx="0">
+            <a:schemeClr val="accent1"/>
+          </a:fillRef>
+          <a:effectRef idx="0">
+            <a:schemeClr val="accent1"/>
+          </a:effectRef>
+          <a:fontRef idx="minor">
+            <a:schemeClr val="tx1"/>
+          </a:fontRef>
+        </p:style>
+      </p:cxnSp>
+      <p:pic>
+        <p:nvPicPr>
+          <p:cNvPr id="75" name="Picture 4" descr="C:\Users\Enzo\Desktop\safari.png"/>
+          <p:cNvPicPr>
+            <a:picLocks noChangeAspect="1" noChangeArrowheads="1"/>
+          </p:cNvPicPr>
+          <p:nvPr/>
+        </p:nvPicPr>
+        <p:blipFill>
+          <a:blip r:embed="rId2" cstate="print"/>
+          <a:srcRect/>
+          <a:stretch>
+            <a:fillRect/>
+          </a:stretch>
+        </p:blipFill>
+        <p:spPr bwMode="auto">
+          <a:xfrm>
+            <a:off x="4907742" y="851402"/>
+            <a:ext cx="941355" cy="636468"/>
+          </a:xfrm>
+          <a:prstGeom prst="rect">
+            <a:avLst/>
+          </a:prstGeom>
+          <a:noFill/>
+        </p:spPr>
+      </p:pic>
+      <p:sp>
+        <p:nvSpPr>
+          <p:cNvPr id="109" name="3 Proceso"/>
+          <p:cNvSpPr/>
+          <p:nvPr/>
+        </p:nvSpPr>
+        <p:spPr>
+          <a:xfrm>
+            <a:off x="272480" y="1857868"/>
+            <a:ext cx="882022" cy="428628"/>
+          </a:xfrm>
+          <a:prstGeom prst="flowChartProcess">
+            <a:avLst/>
+          </a:prstGeom>
+        </p:spPr>
+        <p:style>
+          <a:lnRef idx="2">
+            <a:schemeClr val="accent5">
+              <a:shade val="50000"/>
+            </a:schemeClr>
+          </a:lnRef>
+          <a:fillRef idx="1">
+            <a:schemeClr val="accent5"/>
+          </a:fillRef>
+          <a:effectRef idx="0">
+            <a:schemeClr val="accent5"/>
+          </a:effectRef>
+          <a:fontRef idx="minor">
+            <a:schemeClr val="lt1"/>
+          </a:fontRef>
+        </p:style>
+        <p:txBody>
+          <a:bodyPr lIns="91423" tIns="45711" rIns="91423" bIns="45711" rtlCol="0" anchor="ctr"/>
+          <a:lstStyle/>
+          <a:p>
+            <a:pPr algn="ctr"/>
+            <a:r>
+              <a:rPr lang="es-AR" sz="800" dirty="0" smtClean="0"/>
+              <a:t>El RRP Busca al Alumno en el Sistema</a:t>
+            </a:r>
+          </a:p>
+        </p:txBody>
+      </p:sp>
+      <p:sp>
+        <p:nvSpPr>
+          <p:cNvPr id="110" name="143 Proceso"/>
+          <p:cNvSpPr/>
+          <p:nvPr/>
+        </p:nvSpPr>
+        <p:spPr>
+          <a:xfrm>
+            <a:off x="1784647" y="2027426"/>
+            <a:ext cx="953775" cy="547101"/>
+          </a:xfrm>
+          <a:prstGeom prst="flowChartProcess">
+            <a:avLst/>
+          </a:prstGeom>
+        </p:spPr>
+        <p:style>
+          <a:lnRef idx="2">
+            <a:schemeClr val="accent5">
+              <a:shade val="50000"/>
+            </a:schemeClr>
+          </a:lnRef>
+          <a:fillRef idx="1">
+            <a:schemeClr val="accent5"/>
+          </a:fillRef>
+          <a:effectRef idx="0">
+            <a:schemeClr val="accent5"/>
+          </a:effectRef>
+          <a:fontRef idx="minor">
+            <a:schemeClr val="lt1"/>
+          </a:fontRef>
+        </p:style>
+        <p:txBody>
+          <a:bodyPr lIns="91423" tIns="45711" rIns="91423" bIns="45711" rtlCol="0" anchor="t"/>
+          <a:lstStyle/>
+          <a:p>
+            <a:pPr algn="ctr"/>
+            <a:r>
+              <a:rPr lang="es-AR" sz="800" dirty="0" smtClean="0"/>
+              <a:t>El RRP Busca Paciente en el Sistema y lo Asigna al Alumno</a:t>
+            </a:r>
+          </a:p>
+          <a:p>
+            <a:pPr algn="ctr"/>
+            <a:endParaRPr lang="es-AR" sz="800" dirty="0"/>
+          </a:p>
+        </p:txBody>
+      </p:sp>
+      <p:cxnSp>
+        <p:nvCxnSpPr>
+          <p:cNvPr id="86" name="Conector angular 85"/>
+          <p:cNvCxnSpPr>
+            <a:stCxn id="110" idx="3"/>
+            <a:endCxn id="5" idx="1"/>
+          </p:cNvCxnSpPr>
+          <p:nvPr/>
+        </p:nvCxnSpPr>
+        <p:spPr>
+          <a:xfrm>
+            <a:off x="2738422" y="2300977"/>
+            <a:ext cx="500066" cy="59612"/>
+          </a:xfrm>
+          <a:prstGeom prst="bentConnector3">
+            <a:avLst>
+              <a:gd name="adj1" fmla="val 50000"/>
+            </a:avLst>
+          </a:prstGeom>
+          <a:ln>
+            <a:tailEnd type="triangle"/>
+          </a:ln>
+        </p:spPr>
+        <p:style>
+          <a:lnRef idx="1">
+            <a:schemeClr val="accent1"/>
+          </a:lnRef>
+          <a:fillRef idx="0">
+            <a:schemeClr val="accent1"/>
+          </a:fillRef>
+          <a:effectRef idx="0">
+            <a:schemeClr val="accent1"/>
+          </a:effectRef>
+          <a:fontRef idx="minor">
+            <a:schemeClr val="tx1"/>
+          </a:fontRef>
+        </p:style>
+      </p:cxnSp>
+      <p:cxnSp>
+        <p:nvCxnSpPr>
+          <p:cNvPr id="89" name="Conector angular 88"/>
+          <p:cNvCxnSpPr>
+            <a:stCxn id="109" idx="3"/>
+            <a:endCxn id="110" idx="1"/>
+          </p:cNvCxnSpPr>
+          <p:nvPr/>
+        </p:nvCxnSpPr>
+        <p:spPr>
+          <a:xfrm>
+            <a:off x="1154502" y="2072182"/>
+            <a:ext cx="630145" cy="228795"/>
+          </a:xfrm>
+          <a:prstGeom prst="bentConnector3">
+            <a:avLst/>
+          </a:prstGeom>
+          <a:ln>
+            <a:tailEnd type="triangle"/>
+          </a:ln>
+        </p:spPr>
+        <p:style>
+          <a:lnRef idx="1">
+            <a:schemeClr val="accent1"/>
+          </a:lnRef>
+          <a:fillRef idx="0">
+            <a:schemeClr val="accent1"/>
+          </a:fillRef>
+          <a:effectRef idx="0">
+            <a:schemeClr val="accent1"/>
+          </a:effectRef>
+          <a:fontRef idx="minor">
+            <a:schemeClr val="tx1"/>
+          </a:fontRef>
+        </p:style>
+      </p:cxnSp>
+      <p:cxnSp>
+        <p:nvCxnSpPr>
+          <p:cNvPr id="92" name="Conector angular 91"/>
+          <p:cNvCxnSpPr>
+            <a:stCxn id="56" idx="2"/>
+            <a:endCxn id="109" idx="0"/>
+          </p:cNvCxnSpPr>
+          <p:nvPr/>
+        </p:nvCxnSpPr>
+        <p:spPr>
+          <a:xfrm rot="5400000">
+            <a:off x="487102" y="1618577"/>
+            <a:ext cx="465681" cy="12901"/>
+          </a:xfrm>
+          <a:prstGeom prst="bentConnector3">
+            <a:avLst/>
+          </a:prstGeom>
+          <a:ln>
+            <a:tailEnd type="triangle"/>
+          </a:ln>
+        </p:spPr>
+        <p:style>
+          <a:lnRef idx="1">
+            <a:schemeClr val="accent1"/>
+          </a:lnRef>
+          <a:fillRef idx="0">
+            <a:schemeClr val="accent1"/>
+          </a:fillRef>
+          <a:effectRef idx="0">
+            <a:schemeClr val="accent1"/>
+          </a:effectRef>
+          <a:fontRef idx="minor">
+            <a:schemeClr val="tx1"/>
+          </a:fontRef>
+        </p:style>
+      </p:cxnSp>
+      <p:cxnSp>
+        <p:nvCxnSpPr>
+          <p:cNvPr id="133" name="16 Conector recto de flecha"/>
+          <p:cNvCxnSpPr>
+            <a:stCxn id="109" idx="2"/>
+            <a:endCxn id="15" idx="0"/>
+          </p:cNvCxnSpPr>
+          <p:nvPr/>
+        </p:nvCxnSpPr>
+        <p:spPr>
+          <a:xfrm rot="16200000" flipH="1">
+            <a:off x="841707" y="2158279"/>
+            <a:ext cx="953545" cy="1209977"/>
+          </a:xfrm>
+          <a:prstGeom prst="bentConnector3">
+            <a:avLst>
+              <a:gd name="adj1" fmla="val 50000"/>
+            </a:avLst>
+          </a:prstGeom>
+          <a:ln>
+            <a:prstDash val="dash"/>
+            <a:tailEnd type="arrow"/>
+          </a:ln>
+        </p:spPr>
+        <p:style>
+          <a:lnRef idx="1">
+            <a:schemeClr val="accent1"/>
+          </a:lnRef>
+          <a:fillRef idx="0">
+            <a:schemeClr val="accent1"/>
+          </a:fillRef>
+          <a:effectRef idx="0">
+            <a:schemeClr val="accent1"/>
+          </a:effectRef>
+          <a:fontRef idx="minor">
+            <a:schemeClr val="tx1"/>
+          </a:fontRef>
+        </p:style>
+      </p:cxnSp>
+      <p:cxnSp>
+        <p:nvCxnSpPr>
+          <p:cNvPr id="136" name="16 Conector recto de flecha"/>
+          <p:cNvCxnSpPr>
+            <a:stCxn id="110" idx="2"/>
+            <a:endCxn id="15" idx="3"/>
+          </p:cNvCxnSpPr>
+          <p:nvPr/>
+        </p:nvCxnSpPr>
+        <p:spPr>
+          <a:xfrm rot="16200000" flipH="1">
+            <a:off x="1835966" y="3000096"/>
+            <a:ext cx="983748" cy="132610"/>
+          </a:xfrm>
+          <a:prstGeom prst="bentConnector4">
+            <a:avLst>
+              <a:gd name="adj1" fmla="val 33825"/>
+              <a:gd name="adj2" fmla="val 532001"/>
+            </a:avLst>
+          </a:prstGeom>
+          <a:ln>
+            <a:prstDash val="dash"/>
+            <a:tailEnd type="arrow"/>
+          </a:ln>
+        </p:spPr>
+        <p:style>
+          <a:lnRef idx="1">
+            <a:schemeClr val="accent1"/>
+          </a:lnRef>
+          <a:fillRef idx="0">
+            <a:schemeClr val="accent1"/>
+          </a:fillRef>
+          <a:effectRef idx="0">
+            <a:schemeClr val="accent1"/>
+          </a:effectRef>
+          <a:fontRef idx="minor">
+            <a:schemeClr val="tx1"/>
+          </a:fontRef>
+        </p:style>
+      </p:cxnSp>
+      <p:sp>
+        <p:nvSpPr>
+          <p:cNvPr id="66" name="65 Documento"/>
+          <p:cNvSpPr/>
+          <p:nvPr/>
+        </p:nvSpPr>
+        <p:spPr>
+          <a:xfrm>
+            <a:off x="4738686" y="3869532"/>
+            <a:ext cx="914400" cy="612648"/>
+          </a:xfrm>
+          <a:prstGeom prst="flowChartDocument">
+            <a:avLst/>
+          </a:prstGeom>
+        </p:spPr>
+        <p:style>
+          <a:lnRef idx="2">
+            <a:schemeClr val="accent1">
+              <a:shade val="50000"/>
+            </a:schemeClr>
+          </a:lnRef>
+          <a:fillRef idx="1">
+            <a:schemeClr val="accent1"/>
+          </a:fillRef>
+          <a:effectRef idx="0">
+            <a:schemeClr val="accent1"/>
+          </a:effectRef>
+          <a:fontRef idx="minor">
+            <a:schemeClr val="lt1"/>
+          </a:fontRef>
+        </p:style>
+        <p:txBody>
+          <a:bodyPr rtlCol="0" anchor="ctr"/>
+          <a:lstStyle/>
+          <a:p>
+            <a:pPr algn="ctr"/>
+            <a:r>
+              <a:rPr lang="es-AR" sz="800" dirty="0" smtClean="0"/>
+              <a:t>Paciente asignado y confirmado </a:t>
+            </a:r>
+            <a:endParaRPr lang="es-AR" sz="800" dirty="0" smtClean="0"/>
+          </a:p>
+        </p:txBody>
+      </p:sp>
     </p:spTree>
   </p:cSld>
   <p:clrMapOvr>
@@ -10546,7 +12463,7 @@
     </a:clrScheme>
     <a:fontScheme name="Office">
       <a:majorFont>
-        <a:latin typeface="Calibri Light" panose="020F0302020204030204"/>
+        <a:latin typeface="Calibri Light"/>
         <a:ea typeface=""/>
         <a:cs typeface=""/>
         <a:font script="Jpan" typeface="ＭＳ Ｐゴシック"/>
@@ -10581,7 +12498,7 @@
         <a:font script="Geor" typeface="Sylfaen"/>
       </a:majorFont>
       <a:minorFont>
-        <a:latin typeface="Calibri" panose="020F0502020204030204"/>
+        <a:latin typeface="Calibri"/>
         <a:ea typeface=""/>
         <a:cs typeface=""/>
         <a:font script="Jpan" typeface="ＭＳ Ｐゴシック"/>
@@ -10758,7 +12675,7 @@
   <a:extraClrSchemeLst/>
   <a:extLst>
     <a:ext uri="{05A4C25C-085E-4340-85A3-A5531E510DB2}">
-      <thm15:themeFamily xmlns:thm15="http://schemas.microsoft.com/office/thememl/2012/main" name="Office Theme" id="{62F939B6-93AF-4DB8-9C6B-D6C7DFDC589F}" vid="{4A3C46E8-61CC-4603-A589-7422A47A8E4A}"/>
+      <thm15:themeFamily xmlns:thm15="http://schemas.microsoft.com/office/thememl/2012/main" xmlns="" name="Office Theme" id="{62F939B6-93AF-4DB8-9C6B-D6C7DFDC589F}" vid="{4A3C46E8-61CC-4603-A589-7422A47A8E4A}"/>
     </a:ext>
   </a:extLst>
 </a:theme>

</xml_diff>